<commit_message>
Added tree traversal support document
</commit_message>
<xml_diff>
--- a/Documents/[4]Arboles_binarios-Recorrido.pptx
+++ b/Documents/[4]Arboles_binarios-Recorrido.pptx
@@ -7,6 +7,8 @@
   <p:sldIdLst>
     <p:sldId id="256" r:id="rId2"/>
     <p:sldId id="257" r:id="rId3"/>
+    <p:sldId id="259" r:id="rId4"/>
+    <p:sldId id="260" r:id="rId5"/>
   </p:sldIdLst>
   <p:sldSz cx="12192000" cy="6858000"/>
   <p:notesSz cx="6858000" cy="9144000"/>
@@ -155,7 +157,7 @@
           </a:lstStyle>
           <a:p>
             <a:r>
-              <a:rPr lang="es-ES" smtClean="0"/>
+              <a:rPr lang="es-ES"/>
               <a:t>Haga clic para modificar el estilo de título del patrón</a:t>
             </a:r>
             <a:endParaRPr lang="en-US"/>
@@ -220,7 +222,7 @@
           </a:lstStyle>
           <a:p>
             <a:r>
-              <a:rPr lang="es-ES" smtClean="0"/>
+              <a:rPr lang="es-ES"/>
               <a:t>Haga clic para editar el estilo de subtítulo del patrón</a:t>
             </a:r>
             <a:endParaRPr lang="en-US"/>
@@ -244,7 +246,7 @@
           <a:p>
             <a:fld id="{3726FBD9-8ACB-4A6F-A97B-791135345E30}" type="datetimeFigureOut">
               <a:rPr lang="en-US" smtClean="0"/>
-              <a:t>7/6/2021</a:t>
+              <a:t>7/7/2021</a:t>
             </a:fld>
             <a:endParaRPr lang="en-US"/>
           </a:p>
@@ -286,7 +288,7 @@
           <a:p>
             <a:fld id="{3DB84C99-CF72-4F49-A36A-3145C91A6658}" type="slidenum">
               <a:rPr lang="en-US" smtClean="0"/>
-              <a:t>‹Nº›</a:t>
+              <a:t>‹#›</a:t>
             </a:fld>
             <a:endParaRPr lang="en-US"/>
           </a:p>
@@ -338,7 +340,7 @@
           <a:lstStyle/>
           <a:p>
             <a:r>
-              <a:rPr lang="es-ES" smtClean="0"/>
+              <a:rPr lang="es-ES"/>
               <a:t>Haga clic para modificar el estilo de título del patrón</a:t>
             </a:r>
             <a:endParaRPr lang="en-US"/>
@@ -362,35 +364,35 @@
           <a:p>
             <a:pPr lvl="0"/>
             <a:r>
-              <a:rPr lang="es-ES" smtClean="0"/>
+              <a:rPr lang="es-ES"/>
               <a:t>Editar el estilo de texto del patrón</a:t>
             </a:r>
           </a:p>
           <a:p>
             <a:pPr lvl="1"/>
             <a:r>
-              <a:rPr lang="es-ES" smtClean="0"/>
+              <a:rPr lang="es-ES"/>
               <a:t>Segundo nivel</a:t>
             </a:r>
           </a:p>
           <a:p>
             <a:pPr lvl="2"/>
             <a:r>
-              <a:rPr lang="es-ES" smtClean="0"/>
+              <a:rPr lang="es-ES"/>
               <a:t>Tercer nivel</a:t>
             </a:r>
           </a:p>
           <a:p>
             <a:pPr lvl="3"/>
             <a:r>
-              <a:rPr lang="es-ES" smtClean="0"/>
+              <a:rPr lang="es-ES"/>
               <a:t>Cuarto nivel</a:t>
             </a:r>
           </a:p>
           <a:p>
             <a:pPr lvl="4"/>
             <a:r>
-              <a:rPr lang="es-ES" smtClean="0"/>
+              <a:rPr lang="es-ES"/>
               <a:t>Quinto nivel</a:t>
             </a:r>
             <a:endParaRPr lang="en-US"/>
@@ -414,7 +416,7 @@
           <a:p>
             <a:fld id="{3726FBD9-8ACB-4A6F-A97B-791135345E30}" type="datetimeFigureOut">
               <a:rPr lang="en-US" smtClean="0"/>
-              <a:t>7/6/2021</a:t>
+              <a:t>7/7/2021</a:t>
             </a:fld>
             <a:endParaRPr lang="en-US"/>
           </a:p>
@@ -456,7 +458,7 @@
           <a:p>
             <a:fld id="{3DB84C99-CF72-4F49-A36A-3145C91A6658}" type="slidenum">
               <a:rPr lang="en-US" smtClean="0"/>
-              <a:t>‹Nº›</a:t>
+              <a:t>‹#›</a:t>
             </a:fld>
             <a:endParaRPr lang="en-US"/>
           </a:p>
@@ -513,7 +515,7 @@
           <a:lstStyle/>
           <a:p>
             <a:r>
-              <a:rPr lang="es-ES" smtClean="0"/>
+              <a:rPr lang="es-ES"/>
               <a:t>Haga clic para modificar el estilo de título del patrón</a:t>
             </a:r>
             <a:endParaRPr lang="en-US"/>
@@ -542,35 +544,35 @@
           <a:p>
             <a:pPr lvl="0"/>
             <a:r>
-              <a:rPr lang="es-ES" smtClean="0"/>
+              <a:rPr lang="es-ES"/>
               <a:t>Editar el estilo de texto del patrón</a:t>
             </a:r>
           </a:p>
           <a:p>
             <a:pPr lvl="1"/>
             <a:r>
-              <a:rPr lang="es-ES" smtClean="0"/>
+              <a:rPr lang="es-ES"/>
               <a:t>Segundo nivel</a:t>
             </a:r>
           </a:p>
           <a:p>
             <a:pPr lvl="2"/>
             <a:r>
-              <a:rPr lang="es-ES" smtClean="0"/>
+              <a:rPr lang="es-ES"/>
               <a:t>Tercer nivel</a:t>
             </a:r>
           </a:p>
           <a:p>
             <a:pPr lvl="3"/>
             <a:r>
-              <a:rPr lang="es-ES" smtClean="0"/>
+              <a:rPr lang="es-ES"/>
               <a:t>Cuarto nivel</a:t>
             </a:r>
           </a:p>
           <a:p>
             <a:pPr lvl="4"/>
             <a:r>
-              <a:rPr lang="es-ES" smtClean="0"/>
+              <a:rPr lang="es-ES"/>
               <a:t>Quinto nivel</a:t>
             </a:r>
             <a:endParaRPr lang="en-US"/>
@@ -594,7 +596,7 @@
           <a:p>
             <a:fld id="{3726FBD9-8ACB-4A6F-A97B-791135345E30}" type="datetimeFigureOut">
               <a:rPr lang="en-US" smtClean="0"/>
-              <a:t>7/6/2021</a:t>
+              <a:t>7/7/2021</a:t>
             </a:fld>
             <a:endParaRPr lang="en-US"/>
           </a:p>
@@ -636,7 +638,7 @@
           <a:p>
             <a:fld id="{3DB84C99-CF72-4F49-A36A-3145C91A6658}" type="slidenum">
               <a:rPr lang="en-US" smtClean="0"/>
-              <a:t>‹Nº›</a:t>
+              <a:t>‹#›</a:t>
             </a:fld>
             <a:endParaRPr lang="en-US"/>
           </a:p>
@@ -688,7 +690,7 @@
           <a:lstStyle/>
           <a:p>
             <a:r>
-              <a:rPr lang="es-ES" smtClean="0"/>
+              <a:rPr lang="es-ES"/>
               <a:t>Haga clic para modificar el estilo de título del patrón</a:t>
             </a:r>
             <a:endParaRPr lang="en-US"/>
@@ -712,35 +714,35 @@
           <a:p>
             <a:pPr lvl="0"/>
             <a:r>
-              <a:rPr lang="es-ES" smtClean="0"/>
+              <a:rPr lang="es-ES"/>
               <a:t>Editar el estilo de texto del patrón</a:t>
             </a:r>
           </a:p>
           <a:p>
             <a:pPr lvl="1"/>
             <a:r>
-              <a:rPr lang="es-ES" smtClean="0"/>
+              <a:rPr lang="es-ES"/>
               <a:t>Segundo nivel</a:t>
             </a:r>
           </a:p>
           <a:p>
             <a:pPr lvl="2"/>
             <a:r>
-              <a:rPr lang="es-ES" smtClean="0"/>
+              <a:rPr lang="es-ES"/>
               <a:t>Tercer nivel</a:t>
             </a:r>
           </a:p>
           <a:p>
             <a:pPr lvl="3"/>
             <a:r>
-              <a:rPr lang="es-ES" smtClean="0"/>
+              <a:rPr lang="es-ES"/>
               <a:t>Cuarto nivel</a:t>
             </a:r>
           </a:p>
           <a:p>
             <a:pPr lvl="4"/>
             <a:r>
-              <a:rPr lang="es-ES" smtClean="0"/>
+              <a:rPr lang="es-ES"/>
               <a:t>Quinto nivel</a:t>
             </a:r>
             <a:endParaRPr lang="en-US"/>
@@ -764,7 +766,7 @@
           <a:p>
             <a:fld id="{3726FBD9-8ACB-4A6F-A97B-791135345E30}" type="datetimeFigureOut">
               <a:rPr lang="en-US" smtClean="0"/>
-              <a:t>7/6/2021</a:t>
+              <a:t>7/7/2021</a:t>
             </a:fld>
             <a:endParaRPr lang="en-US"/>
           </a:p>
@@ -806,7 +808,7 @@
           <a:p>
             <a:fld id="{3DB84C99-CF72-4F49-A36A-3145C91A6658}" type="slidenum">
               <a:rPr lang="en-US" smtClean="0"/>
-              <a:t>‹Nº›</a:t>
+              <a:t>‹#›</a:t>
             </a:fld>
             <a:endParaRPr lang="en-US"/>
           </a:p>
@@ -867,7 +869,7 @@
           </a:lstStyle>
           <a:p>
             <a:r>
-              <a:rPr lang="es-ES" smtClean="0"/>
+              <a:rPr lang="es-ES"/>
               <a:t>Haga clic para modificar el estilo de título del patrón</a:t>
             </a:r>
             <a:endParaRPr lang="en-US"/>
@@ -987,7 +989,7 @@
           <a:p>
             <a:pPr lvl="0"/>
             <a:r>
-              <a:rPr lang="es-ES" smtClean="0"/>
+              <a:rPr lang="es-ES"/>
               <a:t>Editar el estilo de texto del patrón</a:t>
             </a:r>
           </a:p>
@@ -1010,7 +1012,7 @@
           <a:p>
             <a:fld id="{3726FBD9-8ACB-4A6F-A97B-791135345E30}" type="datetimeFigureOut">
               <a:rPr lang="en-US" smtClean="0"/>
-              <a:t>7/6/2021</a:t>
+              <a:t>7/7/2021</a:t>
             </a:fld>
             <a:endParaRPr lang="en-US"/>
           </a:p>
@@ -1052,7 +1054,7 @@
           <a:p>
             <a:fld id="{3DB84C99-CF72-4F49-A36A-3145C91A6658}" type="slidenum">
               <a:rPr lang="en-US" smtClean="0"/>
-              <a:t>‹Nº›</a:t>
+              <a:t>‹#›</a:t>
             </a:fld>
             <a:endParaRPr lang="en-US"/>
           </a:p>
@@ -1104,7 +1106,7 @@
           <a:lstStyle/>
           <a:p>
             <a:r>
-              <a:rPr lang="es-ES" smtClean="0"/>
+              <a:rPr lang="es-ES"/>
               <a:t>Haga clic para modificar el estilo de título del patrón</a:t>
             </a:r>
             <a:endParaRPr lang="en-US"/>
@@ -1133,35 +1135,35 @@
           <a:p>
             <a:pPr lvl="0"/>
             <a:r>
-              <a:rPr lang="es-ES" smtClean="0"/>
+              <a:rPr lang="es-ES"/>
               <a:t>Editar el estilo de texto del patrón</a:t>
             </a:r>
           </a:p>
           <a:p>
             <a:pPr lvl="1"/>
             <a:r>
-              <a:rPr lang="es-ES" smtClean="0"/>
+              <a:rPr lang="es-ES"/>
               <a:t>Segundo nivel</a:t>
             </a:r>
           </a:p>
           <a:p>
             <a:pPr lvl="2"/>
             <a:r>
-              <a:rPr lang="es-ES" smtClean="0"/>
+              <a:rPr lang="es-ES"/>
               <a:t>Tercer nivel</a:t>
             </a:r>
           </a:p>
           <a:p>
             <a:pPr lvl="3"/>
             <a:r>
-              <a:rPr lang="es-ES" smtClean="0"/>
+              <a:rPr lang="es-ES"/>
               <a:t>Cuarto nivel</a:t>
             </a:r>
           </a:p>
           <a:p>
             <a:pPr lvl="4"/>
             <a:r>
-              <a:rPr lang="es-ES" smtClean="0"/>
+              <a:rPr lang="es-ES"/>
               <a:t>Quinto nivel</a:t>
             </a:r>
             <a:endParaRPr lang="en-US"/>
@@ -1190,35 +1192,35 @@
           <a:p>
             <a:pPr lvl="0"/>
             <a:r>
-              <a:rPr lang="es-ES" smtClean="0"/>
+              <a:rPr lang="es-ES"/>
               <a:t>Editar el estilo de texto del patrón</a:t>
             </a:r>
           </a:p>
           <a:p>
             <a:pPr lvl="1"/>
             <a:r>
-              <a:rPr lang="es-ES" smtClean="0"/>
+              <a:rPr lang="es-ES"/>
               <a:t>Segundo nivel</a:t>
             </a:r>
           </a:p>
           <a:p>
             <a:pPr lvl="2"/>
             <a:r>
-              <a:rPr lang="es-ES" smtClean="0"/>
+              <a:rPr lang="es-ES"/>
               <a:t>Tercer nivel</a:t>
             </a:r>
           </a:p>
           <a:p>
             <a:pPr lvl="3"/>
             <a:r>
-              <a:rPr lang="es-ES" smtClean="0"/>
+              <a:rPr lang="es-ES"/>
               <a:t>Cuarto nivel</a:t>
             </a:r>
           </a:p>
           <a:p>
             <a:pPr lvl="4"/>
             <a:r>
-              <a:rPr lang="es-ES" smtClean="0"/>
+              <a:rPr lang="es-ES"/>
               <a:t>Quinto nivel</a:t>
             </a:r>
             <a:endParaRPr lang="en-US"/>
@@ -1242,7 +1244,7 @@
           <a:p>
             <a:fld id="{3726FBD9-8ACB-4A6F-A97B-791135345E30}" type="datetimeFigureOut">
               <a:rPr lang="en-US" smtClean="0"/>
-              <a:t>7/6/2021</a:t>
+              <a:t>7/7/2021</a:t>
             </a:fld>
             <a:endParaRPr lang="en-US"/>
           </a:p>
@@ -1284,7 +1286,7 @@
           <a:p>
             <a:fld id="{3DB84C99-CF72-4F49-A36A-3145C91A6658}" type="slidenum">
               <a:rPr lang="en-US" smtClean="0"/>
-              <a:t>‹Nº›</a:t>
+              <a:t>‹#›</a:t>
             </a:fld>
             <a:endParaRPr lang="en-US"/>
           </a:p>
@@ -1341,7 +1343,7 @@
           <a:lstStyle/>
           <a:p>
             <a:r>
-              <a:rPr lang="es-ES" smtClean="0"/>
+              <a:rPr lang="es-ES"/>
               <a:t>Haga clic para modificar el estilo de título del patrón</a:t>
             </a:r>
             <a:endParaRPr lang="en-US"/>
@@ -1407,7 +1409,7 @@
           <a:p>
             <a:pPr lvl="0"/>
             <a:r>
-              <a:rPr lang="es-ES" smtClean="0"/>
+              <a:rPr lang="es-ES"/>
               <a:t>Editar el estilo de texto del patrón</a:t>
             </a:r>
           </a:p>
@@ -1435,35 +1437,35 @@
           <a:p>
             <a:pPr lvl="0"/>
             <a:r>
-              <a:rPr lang="es-ES" smtClean="0"/>
+              <a:rPr lang="es-ES"/>
               <a:t>Editar el estilo de texto del patrón</a:t>
             </a:r>
           </a:p>
           <a:p>
             <a:pPr lvl="1"/>
             <a:r>
-              <a:rPr lang="es-ES" smtClean="0"/>
+              <a:rPr lang="es-ES"/>
               <a:t>Segundo nivel</a:t>
             </a:r>
           </a:p>
           <a:p>
             <a:pPr lvl="2"/>
             <a:r>
-              <a:rPr lang="es-ES" smtClean="0"/>
+              <a:rPr lang="es-ES"/>
               <a:t>Tercer nivel</a:t>
             </a:r>
           </a:p>
           <a:p>
             <a:pPr lvl="3"/>
             <a:r>
-              <a:rPr lang="es-ES" smtClean="0"/>
+              <a:rPr lang="es-ES"/>
               <a:t>Cuarto nivel</a:t>
             </a:r>
           </a:p>
           <a:p>
             <a:pPr lvl="4"/>
             <a:r>
-              <a:rPr lang="es-ES" smtClean="0"/>
+              <a:rPr lang="es-ES"/>
               <a:t>Quinto nivel</a:t>
             </a:r>
             <a:endParaRPr lang="en-US"/>
@@ -1529,7 +1531,7 @@
           <a:p>
             <a:pPr lvl="0"/>
             <a:r>
-              <a:rPr lang="es-ES" smtClean="0"/>
+              <a:rPr lang="es-ES"/>
               <a:t>Editar el estilo de texto del patrón</a:t>
             </a:r>
           </a:p>
@@ -1557,35 +1559,35 @@
           <a:p>
             <a:pPr lvl="0"/>
             <a:r>
-              <a:rPr lang="es-ES" smtClean="0"/>
+              <a:rPr lang="es-ES"/>
               <a:t>Editar el estilo de texto del patrón</a:t>
             </a:r>
           </a:p>
           <a:p>
             <a:pPr lvl="1"/>
             <a:r>
-              <a:rPr lang="es-ES" smtClean="0"/>
+              <a:rPr lang="es-ES"/>
               <a:t>Segundo nivel</a:t>
             </a:r>
           </a:p>
           <a:p>
             <a:pPr lvl="2"/>
             <a:r>
-              <a:rPr lang="es-ES" smtClean="0"/>
+              <a:rPr lang="es-ES"/>
               <a:t>Tercer nivel</a:t>
             </a:r>
           </a:p>
           <a:p>
             <a:pPr lvl="3"/>
             <a:r>
-              <a:rPr lang="es-ES" smtClean="0"/>
+              <a:rPr lang="es-ES"/>
               <a:t>Cuarto nivel</a:t>
             </a:r>
           </a:p>
           <a:p>
             <a:pPr lvl="4"/>
             <a:r>
-              <a:rPr lang="es-ES" smtClean="0"/>
+              <a:rPr lang="es-ES"/>
               <a:t>Quinto nivel</a:t>
             </a:r>
             <a:endParaRPr lang="en-US"/>
@@ -1609,7 +1611,7 @@
           <a:p>
             <a:fld id="{3726FBD9-8ACB-4A6F-A97B-791135345E30}" type="datetimeFigureOut">
               <a:rPr lang="en-US" smtClean="0"/>
-              <a:t>7/6/2021</a:t>
+              <a:t>7/7/2021</a:t>
             </a:fld>
             <a:endParaRPr lang="en-US"/>
           </a:p>
@@ -1651,7 +1653,7 @@
           <a:p>
             <a:fld id="{3DB84C99-CF72-4F49-A36A-3145C91A6658}" type="slidenum">
               <a:rPr lang="en-US" smtClean="0"/>
-              <a:t>‹Nº›</a:t>
+              <a:t>‹#›</a:t>
             </a:fld>
             <a:endParaRPr lang="en-US"/>
           </a:p>
@@ -1703,7 +1705,7 @@
           <a:lstStyle/>
           <a:p>
             <a:r>
-              <a:rPr lang="es-ES" smtClean="0"/>
+              <a:rPr lang="es-ES"/>
               <a:t>Haga clic para modificar el estilo de título del patrón</a:t>
             </a:r>
             <a:endParaRPr lang="en-US"/>
@@ -1727,7 +1729,7 @@
           <a:p>
             <a:fld id="{3726FBD9-8ACB-4A6F-A97B-791135345E30}" type="datetimeFigureOut">
               <a:rPr lang="en-US" smtClean="0"/>
-              <a:t>7/6/2021</a:t>
+              <a:t>7/7/2021</a:t>
             </a:fld>
             <a:endParaRPr lang="en-US"/>
           </a:p>
@@ -1769,7 +1771,7 @@
           <a:p>
             <a:fld id="{3DB84C99-CF72-4F49-A36A-3145C91A6658}" type="slidenum">
               <a:rPr lang="en-US" smtClean="0"/>
-              <a:t>‹Nº›</a:t>
+              <a:t>‹#›</a:t>
             </a:fld>
             <a:endParaRPr lang="en-US"/>
           </a:p>
@@ -1822,7 +1824,7 @@
           <a:p>
             <a:fld id="{3726FBD9-8ACB-4A6F-A97B-791135345E30}" type="datetimeFigureOut">
               <a:rPr lang="en-US" smtClean="0"/>
-              <a:t>7/6/2021</a:t>
+              <a:t>7/7/2021</a:t>
             </a:fld>
             <a:endParaRPr lang="en-US"/>
           </a:p>
@@ -1864,7 +1866,7 @@
           <a:p>
             <a:fld id="{3DB84C99-CF72-4F49-A36A-3145C91A6658}" type="slidenum">
               <a:rPr lang="en-US" smtClean="0"/>
-              <a:t>‹Nº›</a:t>
+              <a:t>‹#›</a:t>
             </a:fld>
             <a:endParaRPr lang="en-US"/>
           </a:p>
@@ -1925,7 +1927,7 @@
           </a:lstStyle>
           <a:p>
             <a:r>
-              <a:rPr lang="es-ES" smtClean="0"/>
+              <a:rPr lang="es-ES"/>
               <a:t>Haga clic para modificar el estilo de título del patrón</a:t>
             </a:r>
             <a:endParaRPr lang="en-US"/>
@@ -1982,35 +1984,35 @@
           <a:p>
             <a:pPr lvl="0"/>
             <a:r>
-              <a:rPr lang="es-ES" smtClean="0"/>
+              <a:rPr lang="es-ES"/>
               <a:t>Editar el estilo de texto del patrón</a:t>
             </a:r>
           </a:p>
           <a:p>
             <a:pPr lvl="1"/>
             <a:r>
-              <a:rPr lang="es-ES" smtClean="0"/>
+              <a:rPr lang="es-ES"/>
               <a:t>Segundo nivel</a:t>
             </a:r>
           </a:p>
           <a:p>
             <a:pPr lvl="2"/>
             <a:r>
-              <a:rPr lang="es-ES" smtClean="0"/>
+              <a:rPr lang="es-ES"/>
               <a:t>Tercer nivel</a:t>
             </a:r>
           </a:p>
           <a:p>
             <a:pPr lvl="3"/>
             <a:r>
-              <a:rPr lang="es-ES" smtClean="0"/>
+              <a:rPr lang="es-ES"/>
               <a:t>Cuarto nivel</a:t>
             </a:r>
           </a:p>
           <a:p>
             <a:pPr lvl="4"/>
             <a:r>
-              <a:rPr lang="es-ES" smtClean="0"/>
+              <a:rPr lang="es-ES"/>
               <a:t>Quinto nivel</a:t>
             </a:r>
             <a:endParaRPr lang="en-US"/>
@@ -2076,7 +2078,7 @@
           <a:p>
             <a:pPr lvl="0"/>
             <a:r>
-              <a:rPr lang="es-ES" smtClean="0"/>
+              <a:rPr lang="es-ES"/>
               <a:t>Editar el estilo de texto del patrón</a:t>
             </a:r>
           </a:p>
@@ -2099,7 +2101,7 @@
           <a:p>
             <a:fld id="{3726FBD9-8ACB-4A6F-A97B-791135345E30}" type="datetimeFigureOut">
               <a:rPr lang="en-US" smtClean="0"/>
-              <a:t>7/6/2021</a:t>
+              <a:t>7/7/2021</a:t>
             </a:fld>
             <a:endParaRPr lang="en-US"/>
           </a:p>
@@ -2141,7 +2143,7 @@
           <a:p>
             <a:fld id="{3DB84C99-CF72-4F49-A36A-3145C91A6658}" type="slidenum">
               <a:rPr lang="en-US" smtClean="0"/>
-              <a:t>‹Nº›</a:t>
+              <a:t>‹#›</a:t>
             </a:fld>
             <a:endParaRPr lang="en-US"/>
           </a:p>
@@ -2202,7 +2204,7 @@
           </a:lstStyle>
           <a:p>
             <a:r>
-              <a:rPr lang="es-ES" smtClean="0"/>
+              <a:rPr lang="es-ES"/>
               <a:t>Haga clic para modificar el estilo de título del patrón</a:t>
             </a:r>
             <a:endParaRPr lang="en-US"/>
@@ -2329,7 +2331,7 @@
           <a:p>
             <a:pPr lvl="0"/>
             <a:r>
-              <a:rPr lang="es-ES" smtClean="0"/>
+              <a:rPr lang="es-ES"/>
               <a:t>Editar el estilo de texto del patrón</a:t>
             </a:r>
           </a:p>
@@ -2352,7 +2354,7 @@
           <a:p>
             <a:fld id="{3726FBD9-8ACB-4A6F-A97B-791135345E30}" type="datetimeFigureOut">
               <a:rPr lang="en-US" smtClean="0"/>
-              <a:t>7/6/2021</a:t>
+              <a:t>7/7/2021</a:t>
             </a:fld>
             <a:endParaRPr lang="en-US"/>
           </a:p>
@@ -2394,7 +2396,7 @@
           <a:p>
             <a:fld id="{3DB84C99-CF72-4F49-A36A-3145C91A6658}" type="slidenum">
               <a:rPr lang="en-US" smtClean="0"/>
-              <a:t>‹Nº›</a:t>
+              <a:t>‹#›</a:t>
             </a:fld>
             <a:endParaRPr lang="en-US"/>
           </a:p>
@@ -2461,7 +2463,7 @@
           <a:lstStyle/>
           <a:p>
             <a:r>
-              <a:rPr lang="es-ES" smtClean="0"/>
+              <a:rPr lang="es-ES"/>
               <a:t>Haga clic para modificar el estilo de título del patrón</a:t>
             </a:r>
             <a:endParaRPr lang="en-US"/>
@@ -2495,35 +2497,35 @@
           <a:p>
             <a:pPr lvl="0"/>
             <a:r>
-              <a:rPr lang="es-ES" smtClean="0"/>
+              <a:rPr lang="es-ES"/>
               <a:t>Editar el estilo de texto del patrón</a:t>
             </a:r>
           </a:p>
           <a:p>
             <a:pPr lvl="1"/>
             <a:r>
-              <a:rPr lang="es-ES" smtClean="0"/>
+              <a:rPr lang="es-ES"/>
               <a:t>Segundo nivel</a:t>
             </a:r>
           </a:p>
           <a:p>
             <a:pPr lvl="2"/>
             <a:r>
-              <a:rPr lang="es-ES" smtClean="0"/>
+              <a:rPr lang="es-ES"/>
               <a:t>Tercer nivel</a:t>
             </a:r>
           </a:p>
           <a:p>
             <a:pPr lvl="3"/>
             <a:r>
-              <a:rPr lang="es-ES" smtClean="0"/>
+              <a:rPr lang="es-ES"/>
               <a:t>Cuarto nivel</a:t>
             </a:r>
           </a:p>
           <a:p>
             <a:pPr lvl="4"/>
             <a:r>
-              <a:rPr lang="es-ES" smtClean="0"/>
+              <a:rPr lang="es-ES"/>
               <a:t>Quinto nivel</a:t>
             </a:r>
             <a:endParaRPr lang="en-US"/>
@@ -2565,7 +2567,7 @@
           <a:p>
             <a:fld id="{3726FBD9-8ACB-4A6F-A97B-791135345E30}" type="datetimeFigureOut">
               <a:rPr lang="en-US" smtClean="0"/>
-              <a:t>7/6/2021</a:t>
+              <a:t>7/7/2021</a:t>
             </a:fld>
             <a:endParaRPr lang="en-US"/>
           </a:p>
@@ -2643,7 +2645,7 @@
           <a:p>
             <a:fld id="{3DB84C99-CF72-4F49-A36A-3145C91A6658}" type="slidenum">
               <a:rPr lang="en-US" smtClean="0"/>
-              <a:t>‹Nº›</a:t>
+              <a:t>‹#›</a:t>
             </a:fld>
             <a:endParaRPr lang="en-US"/>
           </a:p>
@@ -3079,114 +3081,178 @@
             <p:ph type="ctrTitle"/>
           </p:nvPr>
         </p:nvSpPr>
-        <p:spPr/>
-        <p:txBody>
-          <a:bodyPr/>
-          <a:lstStyle/>
-          <a:p>
-            <a:r>
-              <a:rPr lang="es-MX" b="1" dirty="0" smtClean="0">
+        <p:spPr>
+          <a:xfrm>
+            <a:off x="911440" y="1141911"/>
+            <a:ext cx="10505243" cy="2387600"/>
+          </a:xfrm>
+        </p:spPr>
+        <p:txBody>
+          <a:bodyPr/>
+          <a:lstStyle/>
+          <a:p>
+            <a:r>
+              <a:rPr lang="es-MX" b="1" dirty="0">
                 <a:solidFill>
                   <a:schemeClr val="bg1"/>
                 </a:solidFill>
+                <a:latin typeface="DengXian" panose="02010600030101010101" pitchFamily="2" charset="-122"/>
+                <a:ea typeface="DengXian" panose="02010600030101010101" pitchFamily="2" charset="-122"/>
               </a:rPr>
               <a:t>Arboles</a:t>
             </a:r>
             <a:r>
-              <a:rPr lang="en-US" b="1" dirty="0" smtClean="0">
+              <a:rPr lang="en-US" b="1" dirty="0">
                 <a:solidFill>
                   <a:schemeClr val="bg1"/>
                 </a:solidFill>
+                <a:latin typeface="DengXian" panose="02010600030101010101" pitchFamily="2" charset="-122"/>
+                <a:ea typeface="DengXian" panose="02010600030101010101" pitchFamily="2" charset="-122"/>
               </a:rPr>
               <a:t>  </a:t>
             </a:r>
             <a:r>
-              <a:rPr lang="en-US" b="1" dirty="0" err="1" smtClean="0">
+              <a:rPr lang="es-MX" b="1" dirty="0">
                 <a:solidFill>
                   <a:schemeClr val="bg1"/>
                 </a:solidFill>
+                <a:latin typeface="DengXian" panose="02010600030101010101" pitchFamily="2" charset="-122"/>
+                <a:ea typeface="DengXian" panose="02010600030101010101" pitchFamily="2" charset="-122"/>
               </a:rPr>
               <a:t>binarios</a:t>
             </a:r>
             <a:r>
-              <a:rPr lang="en-US" b="1" dirty="0" smtClean="0">
+              <a:rPr lang="en-US" b="1" dirty="0">
                 <a:solidFill>
                   <a:schemeClr val="bg1"/>
                 </a:solidFill>
+                <a:latin typeface="DengXian" panose="02010600030101010101" pitchFamily="2" charset="-122"/>
+                <a:ea typeface="DengXian" panose="02010600030101010101" pitchFamily="2" charset="-122"/>
               </a:rPr>
               <a:t> - </a:t>
             </a:r>
             <a:r>
-              <a:rPr lang="en-US" b="1" dirty="0" err="1">
+              <a:rPr lang="es-MX" b="1" dirty="0">
                 <a:solidFill>
                   <a:schemeClr val="bg1"/>
                 </a:solidFill>
+                <a:latin typeface="DengXian" panose="02010600030101010101" pitchFamily="2" charset="-122"/>
+                <a:ea typeface="DengXian" panose="02010600030101010101" pitchFamily="2" charset="-122"/>
               </a:rPr>
-              <a:t>R</a:t>
-            </a:r>
-            <a:r>
-              <a:rPr lang="en-US" b="1" dirty="0" err="1" smtClean="0">
+              <a:t>Recorrido</a:t>
+            </a:r>
+          </a:p>
+        </p:txBody>
+      </p:sp>
+      <p:sp>
+        <p:nvSpPr>
+          <p:cNvPr id="3" name="Subtítulo 2"/>
+          <p:cNvSpPr>
+            <a:spLocks noGrp="1"/>
+          </p:cNvSpPr>
+          <p:nvPr>
+            <p:ph type="subTitle" idx="1"/>
+          </p:nvPr>
+        </p:nvSpPr>
+        <p:spPr/>
+        <p:txBody>
+          <a:bodyPr/>
+          <a:lstStyle/>
+          <a:p>
+            <a:r>
+              <a:rPr lang="es-MX" b="1" dirty="0">
                 <a:solidFill>
                   <a:schemeClr val="bg1"/>
                 </a:solidFill>
+                <a:latin typeface="DengXian" panose="02010600030101010101" pitchFamily="2" charset="-122"/>
+                <a:ea typeface="DengXian" panose="02010600030101010101" pitchFamily="2" charset="-122"/>
               </a:rPr>
-              <a:t>ecorrido</a:t>
-            </a:r>
-            <a:endParaRPr lang="en-US" b="1" dirty="0">
-              <a:solidFill>
-                <a:schemeClr val="bg1"/>
-              </a:solidFill>
-            </a:endParaRPr>
-          </a:p>
-        </p:txBody>
-      </p:sp>
-      <p:sp>
-        <p:nvSpPr>
-          <p:cNvPr id="3" name="Subtítulo 2"/>
-          <p:cNvSpPr>
-            <a:spLocks noGrp="1"/>
-          </p:cNvSpPr>
-          <p:nvPr>
-            <p:ph type="subTitle" idx="1"/>
-          </p:nvPr>
-        </p:nvSpPr>
-        <p:spPr/>
-        <p:txBody>
-          <a:bodyPr/>
-          <a:lstStyle/>
-          <a:p>
-            <a:r>
-              <a:rPr lang="en-US" b="1" dirty="0" err="1" smtClean="0">
+              <a:t>Estructura</a:t>
+            </a:r>
+            <a:r>
+              <a:rPr lang="en-US" b="1" dirty="0">
                 <a:solidFill>
                   <a:schemeClr val="bg1"/>
                 </a:solidFill>
+                <a:latin typeface="DengXian" panose="02010600030101010101" pitchFamily="2" charset="-122"/>
+                <a:ea typeface="DengXian" panose="02010600030101010101" pitchFamily="2" charset="-122"/>
               </a:rPr>
-              <a:t>Estructura</a:t>
-            </a:r>
-            <a:r>
-              <a:rPr lang="en-US" b="1" dirty="0" smtClean="0">
+              <a:t> de </a:t>
+            </a:r>
+            <a:r>
+              <a:rPr lang="es-MX" b="1" dirty="0">
                 <a:solidFill>
                   <a:schemeClr val="bg1"/>
                 </a:solidFill>
-              </a:rPr>
-              <a:t> de </a:t>
-            </a:r>
-            <a:r>
-              <a:rPr lang="en-US" b="1" dirty="0" err="1" smtClean="0">
-                <a:solidFill>
-                  <a:schemeClr val="bg1"/>
-                </a:solidFill>
+                <a:latin typeface="DengXian" panose="02010600030101010101" pitchFamily="2" charset="-122"/>
+                <a:ea typeface="DengXian" panose="02010600030101010101" pitchFamily="2" charset="-122"/>
               </a:rPr>
               <a:t>datos</a:t>
             </a:r>
-            <a:endParaRPr lang="en-US" b="1" dirty="0">
-              <a:solidFill>
-                <a:schemeClr val="bg1"/>
-              </a:solidFill>
-            </a:endParaRPr>
-          </a:p>
-        </p:txBody>
-      </p:sp>
+          </a:p>
+        </p:txBody>
+      </p:sp>
+      <p:pic>
+        <p:nvPicPr>
+          <p:cNvPr id="6" name="Picture 2" descr="INTRANET">
+            <a:extLst>
+              <a:ext uri="{FF2B5EF4-FFF2-40B4-BE49-F238E27FC236}">
+                <a16:creationId xmlns:a16="http://schemas.microsoft.com/office/drawing/2014/main" id="{5889E786-382F-4716-9309-08D6FDF9D16D}"/>
+              </a:ext>
+            </a:extLst>
+          </p:cNvPr>
+          <p:cNvPicPr>
+            <a:picLocks noChangeAspect="1" noChangeArrowheads="1"/>
+          </p:cNvPicPr>
+          <p:nvPr/>
+        </p:nvPicPr>
+        <p:blipFill>
+          <a:blip r:embed="rId4">
+            <a:extLst>
+              <a:ext uri="{BEBA8EAE-BF5A-486C-A8C5-ECC9F3942E4B}">
+                <a14:imgProps xmlns:a14="http://schemas.microsoft.com/office/drawing/2010/main">
+                  <a14:imgLayer r:embed="rId5">
+                    <a14:imgEffect>
+                      <a14:backgroundRemoval t="10000" b="90000" l="10000" r="90000">
+                        <a14:backgroundMark x1="21040" y1="15200" x2="28713" y2="52000"/>
+                        <a14:backgroundMark x1="28713" y1="52000" x2="24752" y2="92000"/>
+                        <a14:backgroundMark x1="24752" y1="92000" x2="10396" y2="93600"/>
+                        <a14:backgroundMark x1="10396" y1="93600" x2="248" y2="75200"/>
+                      </a14:backgroundRemoval>
+                    </a14:imgEffect>
+                  </a14:imgLayer>
+                </a14:imgProps>
+              </a:ext>
+              <a:ext uri="{28A0092B-C50C-407E-A947-70E740481C1C}">
+                <a14:useLocalDpi xmlns:a14="http://schemas.microsoft.com/office/drawing/2010/main" val="0"/>
+              </a:ext>
+            </a:extLst>
+          </a:blip>
+          <a:srcRect/>
+          <a:stretch>
+            <a:fillRect/>
+          </a:stretch>
+        </p:blipFill>
+        <p:spPr bwMode="auto">
+          <a:xfrm>
+            <a:off x="3816843" y="2744423"/>
+            <a:ext cx="3848100" cy="1190625"/>
+          </a:xfrm>
+          <a:prstGeom prst="rect">
+            <a:avLst/>
+          </a:prstGeom>
+          <a:noFill/>
+          <a:extLst>
+            <a:ext uri="{909E8E84-426E-40DD-AFC4-6F175D3DCCD1}">
+              <a14:hiddenFill xmlns:a14="http://schemas.microsoft.com/office/drawing/2010/main">
+                <a:solidFill>
+                  <a:srgbClr val="FFFFFF"/>
+                </a:solidFill>
+              </a14:hiddenFill>
+            </a:ext>
+          </a:extLst>
+        </p:spPr>
+      </p:pic>
     </p:spTree>
     <p:extLst>
       <p:ext uri="{BB962C8B-B14F-4D97-AF65-F5344CB8AC3E}">
@@ -3241,18 +3307,15 @@
           <a:lstStyle/>
           <a:p>
             <a:r>
-              <a:rPr lang="en-US" dirty="0" err="1" smtClean="0">
+              <a:rPr lang="es-MX" dirty="0">
                 <a:solidFill>
                   <a:schemeClr val="bg1"/>
                 </a:solidFill>
+                <a:latin typeface="DengXian" panose="02010600030101010101" pitchFamily="2" charset="-122"/>
+                <a:ea typeface="DengXian" panose="02010600030101010101" pitchFamily="2" charset="-122"/>
               </a:rPr>
               <a:t>Resumen</a:t>
             </a:r>
-            <a:endParaRPr lang="en-US" dirty="0">
-              <a:solidFill>
-                <a:schemeClr val="bg1"/>
-              </a:solidFill>
-            </a:endParaRPr>
           </a:p>
         </p:txBody>
       </p:sp>
@@ -3271,7 +3334,70 @@
           <a:bodyPr/>
           <a:lstStyle/>
           <a:p>
-            <a:endParaRPr lang="en-US" dirty="0"/>
+            <a:r>
+              <a:rPr lang="en-US" dirty="0">
+                <a:solidFill>
+                  <a:schemeClr val="lt1"/>
+                </a:solidFill>
+                <a:latin typeface="DengXian" panose="02010600030101010101" pitchFamily="2" charset="-122"/>
+                <a:ea typeface="DengXian" panose="02010600030101010101" pitchFamily="2" charset="-122"/>
+              </a:rPr>
+              <a:t> </a:t>
+            </a:r>
+            <a:r>
+              <a:rPr lang="es-MX" dirty="0">
+                <a:solidFill>
+                  <a:schemeClr val="lt1"/>
+                </a:solidFill>
+                <a:latin typeface="DengXian" panose="02010600030101010101" pitchFamily="2" charset="-122"/>
+                <a:ea typeface="DengXian" panose="02010600030101010101" pitchFamily="2" charset="-122"/>
+              </a:rPr>
+              <a:t>Los arboles son estructuras no lineales</a:t>
+            </a:r>
+          </a:p>
+          <a:p>
+            <a:r>
+              <a:rPr lang="es-MX" dirty="0">
+                <a:solidFill>
+                  <a:schemeClr val="lt1"/>
+                </a:solidFill>
+                <a:latin typeface="DengXian" panose="02010600030101010101" pitchFamily="2" charset="-122"/>
+                <a:ea typeface="DengXian" panose="02010600030101010101" pitchFamily="2" charset="-122"/>
+              </a:rPr>
+              <a:t>Una estructura de datos lineal se basa en un nodo apuntando a otro nodo</a:t>
+            </a:r>
+          </a:p>
+          <a:p>
+            <a:r>
+              <a:rPr lang="es-MX" dirty="0">
+                <a:solidFill>
+                  <a:schemeClr val="lt1"/>
+                </a:solidFill>
+                <a:latin typeface="DengXian" panose="02010600030101010101" pitchFamily="2" charset="-122"/>
+                <a:ea typeface="DengXian" panose="02010600030101010101" pitchFamily="2" charset="-122"/>
+              </a:rPr>
+              <a:t>En un árbol los nodos pueden apuntar a un numero </a:t>
+            </a:r>
+            <a:r>
+              <a:rPr lang="es-MX" i="1" dirty="0">
+                <a:solidFill>
+                  <a:schemeClr val="lt1"/>
+                </a:solidFill>
+                <a:latin typeface="DengXian" panose="02010600030101010101" pitchFamily="2" charset="-122"/>
+                <a:ea typeface="DengXian" panose="02010600030101010101" pitchFamily="2" charset="-122"/>
+              </a:rPr>
+              <a:t>indefinido</a:t>
+            </a:r>
+            <a:r>
+              <a:rPr lang="es-MX" dirty="0">
+                <a:solidFill>
+                  <a:schemeClr val="lt1"/>
+                </a:solidFill>
+                <a:latin typeface="DengXian" panose="02010600030101010101" pitchFamily="2" charset="-122"/>
+                <a:ea typeface="DengXian" panose="02010600030101010101" pitchFamily="2" charset="-122"/>
+              </a:rPr>
+              <a:t> de nodos</a:t>
+            </a:r>
           </a:p>
         </p:txBody>
       </p:sp>
@@ -3285,6 +3411,1468 @@
   <p:clrMapOvr>
     <a:masterClrMapping/>
   </p:clrMapOvr>
+  <p:timing>
+    <p:tnLst>
+      <p:par>
+        <p:cTn id="1" dur="indefinite" restart="never" nodeType="tmRoot">
+          <p:childTnLst>
+            <p:seq concurrent="1" nextAc="seek">
+              <p:cTn id="2" dur="indefinite" nodeType="mainSeq">
+                <p:childTnLst>
+                  <p:par>
+                    <p:cTn id="3" fill="hold">
+                      <p:stCondLst>
+                        <p:cond delay="indefinite"/>
+                      </p:stCondLst>
+                      <p:childTnLst>
+                        <p:par>
+                          <p:cTn id="4" fill="hold">
+                            <p:stCondLst>
+                              <p:cond delay="0"/>
+                            </p:stCondLst>
+                            <p:childTnLst>
+                              <p:par>
+                                <p:cTn id="5" presetID="1" presetClass="entr" presetSubtype="0" fill="hold" nodeType="clickEffect">
+                                  <p:stCondLst>
+                                    <p:cond delay="0"/>
+                                  </p:stCondLst>
+                                  <p:childTnLst>
+                                    <p:set>
+                                      <p:cBhvr>
+                                        <p:cTn id="6" dur="1" fill="hold">
+                                          <p:stCondLst>
+                                            <p:cond delay="0"/>
+                                          </p:stCondLst>
+                                        </p:cTn>
+                                        <p:tgtEl>
+                                          <p:spTgt spid="3">
+                                            <p:txEl>
+                                              <p:pRg st="0" end="0"/>
+                                            </p:txEl>
+                                          </p:spTgt>
+                                        </p:tgtEl>
+                                        <p:attrNameLst>
+                                          <p:attrName>style.visibility</p:attrName>
+                                        </p:attrNameLst>
+                                      </p:cBhvr>
+                                      <p:to>
+                                        <p:strVal val="visible"/>
+                                      </p:to>
+                                    </p:set>
+                                  </p:childTnLst>
+                                </p:cTn>
+                              </p:par>
+                            </p:childTnLst>
+                          </p:cTn>
+                        </p:par>
+                      </p:childTnLst>
+                    </p:cTn>
+                  </p:par>
+                  <p:par>
+                    <p:cTn id="7" fill="hold">
+                      <p:stCondLst>
+                        <p:cond delay="indefinite"/>
+                      </p:stCondLst>
+                      <p:childTnLst>
+                        <p:par>
+                          <p:cTn id="8" fill="hold">
+                            <p:stCondLst>
+                              <p:cond delay="0"/>
+                            </p:stCondLst>
+                            <p:childTnLst>
+                              <p:par>
+                                <p:cTn id="9" presetID="1" presetClass="entr" presetSubtype="0" fill="hold" nodeType="clickEffect">
+                                  <p:stCondLst>
+                                    <p:cond delay="0"/>
+                                  </p:stCondLst>
+                                  <p:childTnLst>
+                                    <p:set>
+                                      <p:cBhvr>
+                                        <p:cTn id="10" dur="1" fill="hold">
+                                          <p:stCondLst>
+                                            <p:cond delay="0"/>
+                                          </p:stCondLst>
+                                        </p:cTn>
+                                        <p:tgtEl>
+                                          <p:spTgt spid="3">
+                                            <p:txEl>
+                                              <p:pRg st="1" end="1"/>
+                                            </p:txEl>
+                                          </p:spTgt>
+                                        </p:tgtEl>
+                                        <p:attrNameLst>
+                                          <p:attrName>style.visibility</p:attrName>
+                                        </p:attrNameLst>
+                                      </p:cBhvr>
+                                      <p:to>
+                                        <p:strVal val="visible"/>
+                                      </p:to>
+                                    </p:set>
+                                  </p:childTnLst>
+                                </p:cTn>
+                              </p:par>
+                            </p:childTnLst>
+                          </p:cTn>
+                        </p:par>
+                      </p:childTnLst>
+                    </p:cTn>
+                  </p:par>
+                  <p:par>
+                    <p:cTn id="11" fill="hold">
+                      <p:stCondLst>
+                        <p:cond delay="indefinite"/>
+                      </p:stCondLst>
+                      <p:childTnLst>
+                        <p:par>
+                          <p:cTn id="12" fill="hold">
+                            <p:stCondLst>
+                              <p:cond delay="0"/>
+                            </p:stCondLst>
+                            <p:childTnLst>
+                              <p:par>
+                                <p:cTn id="13" presetID="1" presetClass="entr" presetSubtype="0" fill="hold" nodeType="clickEffect">
+                                  <p:stCondLst>
+                                    <p:cond delay="0"/>
+                                  </p:stCondLst>
+                                  <p:childTnLst>
+                                    <p:set>
+                                      <p:cBhvr>
+                                        <p:cTn id="14" dur="1" fill="hold">
+                                          <p:stCondLst>
+                                            <p:cond delay="0"/>
+                                          </p:stCondLst>
+                                        </p:cTn>
+                                        <p:tgtEl>
+                                          <p:spTgt spid="3">
+                                            <p:txEl>
+                                              <p:pRg st="2" end="2"/>
+                                            </p:txEl>
+                                          </p:spTgt>
+                                        </p:tgtEl>
+                                        <p:attrNameLst>
+                                          <p:attrName>style.visibility</p:attrName>
+                                        </p:attrNameLst>
+                                      </p:cBhvr>
+                                      <p:to>
+                                        <p:strVal val="visible"/>
+                                      </p:to>
+                                    </p:set>
+                                  </p:childTnLst>
+                                </p:cTn>
+                              </p:par>
+                            </p:childTnLst>
+                          </p:cTn>
+                        </p:par>
+                      </p:childTnLst>
+                    </p:cTn>
+                  </p:par>
+                </p:childTnLst>
+              </p:cTn>
+              <p:prevCondLst>
+                <p:cond evt="onPrev" delay="0">
+                  <p:tgtEl>
+                    <p:sldTgt/>
+                  </p:tgtEl>
+                </p:cond>
+              </p:prevCondLst>
+              <p:nextCondLst>
+                <p:cond evt="onNext" delay="0">
+                  <p:tgtEl>
+                    <p:sldTgt/>
+                  </p:tgtEl>
+                </p:cond>
+              </p:nextCondLst>
+            </p:seq>
+          </p:childTnLst>
+        </p:cTn>
+      </p:par>
+    </p:tnLst>
+  </p:timing>
+</p:sld>
+</file>
+
+<file path=ppt/slides/slide3.xml><?xml version="1.0" encoding="utf-8"?>
+<p:sld xmlns:a="http://schemas.openxmlformats.org/drawingml/2006/main" xmlns:r="http://schemas.openxmlformats.org/officeDocument/2006/relationships" xmlns:p="http://schemas.openxmlformats.org/presentationml/2006/main">
+  <p:cSld>
+    <p:bg>
+      <p:bgPr>
+        <a:solidFill>
+          <a:schemeClr val="tx1"/>
+        </a:solidFill>
+        <a:effectLst/>
+      </p:bgPr>
+    </p:bg>
+    <p:spTree>
+      <p:nvGrpSpPr>
+        <p:cNvPr id="1" name=""/>
+        <p:cNvGrpSpPr/>
+        <p:nvPr/>
+      </p:nvGrpSpPr>
+      <p:grpSpPr>
+        <a:xfrm>
+          <a:off x="0" y="0"/>
+          <a:ext cx="0" cy="0"/>
+          <a:chOff x="0" y="0"/>
+          <a:chExt cx="0" cy="0"/>
+        </a:xfrm>
+      </p:grpSpPr>
+      <p:sp>
+        <p:nvSpPr>
+          <p:cNvPr id="8" name="TextBox 7">
+            <a:extLst>
+              <a:ext uri="{FF2B5EF4-FFF2-40B4-BE49-F238E27FC236}">
+                <a16:creationId xmlns:a16="http://schemas.microsoft.com/office/drawing/2014/main" id="{D43F8E2D-B396-4336-AE4E-0C78A348891B}"/>
+              </a:ext>
+            </a:extLst>
+          </p:cNvPr>
+          <p:cNvSpPr txBox="1"/>
+          <p:nvPr/>
+        </p:nvSpPr>
+        <p:spPr>
+          <a:xfrm>
+            <a:off x="4438834" y="1553592"/>
+            <a:ext cx="2874505" cy="3154710"/>
+          </a:xfrm>
+          <a:prstGeom prst="rect">
+            <a:avLst/>
+          </a:prstGeom>
+          <a:noFill/>
+        </p:spPr>
+        <p:txBody>
+          <a:bodyPr wrap="none" rtlCol="0">
+            <a:spAutoFit/>
+          </a:bodyPr>
+          <a:lstStyle/>
+          <a:p>
+            <a:r>
+              <a:rPr lang="es-MX" sz="19900" dirty="0">
+                <a:solidFill>
+                  <a:schemeClr val="bg1">
+                    <a:lumMod val="95000"/>
+                  </a:schemeClr>
+                </a:solidFill>
+                <a:latin typeface="DengXian" panose="02010600030101010101" pitchFamily="2" charset="-122"/>
+                <a:ea typeface="DengXian" panose="02010600030101010101" pitchFamily="2" charset="-122"/>
+              </a:rPr>
+              <a:t>32</a:t>
+            </a:r>
+            <a:endParaRPr lang="en-US" dirty="0">
+              <a:solidFill>
+                <a:schemeClr val="bg1">
+                  <a:lumMod val="95000"/>
+                </a:schemeClr>
+              </a:solidFill>
+              <a:latin typeface="DengXian" panose="02010600030101010101" pitchFamily="2" charset="-122"/>
+              <a:ea typeface="DengXian" panose="02010600030101010101" pitchFamily="2" charset="-122"/>
+            </a:endParaRPr>
+          </a:p>
+        </p:txBody>
+      </p:sp>
+      <p:sp>
+        <p:nvSpPr>
+          <p:cNvPr id="9" name="Rectangle: Rounded Corners 8">
+            <a:extLst>
+              <a:ext uri="{FF2B5EF4-FFF2-40B4-BE49-F238E27FC236}">
+                <a16:creationId xmlns:a16="http://schemas.microsoft.com/office/drawing/2014/main" id="{41D1259F-29E9-461E-8CE1-1740039D217F}"/>
+              </a:ext>
+            </a:extLst>
+          </p:cNvPr>
+          <p:cNvSpPr/>
+          <p:nvPr/>
+        </p:nvSpPr>
+        <p:spPr>
+          <a:xfrm>
+            <a:off x="4016214" y="1271075"/>
+            <a:ext cx="3719744" cy="3719744"/>
+          </a:xfrm>
+          <a:prstGeom prst="roundRect">
+            <a:avLst/>
+          </a:prstGeom>
+          <a:noFill/>
+          <a:ln w="38100" cap="flat" cmpd="sng" algn="ctr">
+            <a:solidFill>
+              <a:schemeClr val="accent1"/>
+            </a:solidFill>
+            <a:prstDash val="solid"/>
+            <a:round/>
+            <a:headEnd type="none" w="med" len="med"/>
+            <a:tailEnd type="none" w="med" len="med"/>
+          </a:ln>
+        </p:spPr>
+        <p:style>
+          <a:lnRef idx="0">
+            <a:scrgbClr r="0" g="0" b="0"/>
+          </a:lnRef>
+          <a:fillRef idx="0">
+            <a:scrgbClr r="0" g="0" b="0"/>
+          </a:fillRef>
+          <a:effectRef idx="0">
+            <a:scrgbClr r="0" g="0" b="0"/>
+          </a:effectRef>
+          <a:fontRef idx="minor">
+            <a:schemeClr val="accent1"/>
+          </a:fontRef>
+        </p:style>
+        <p:txBody>
+          <a:bodyPr rtlCol="0" anchor="ctr"/>
+          <a:lstStyle/>
+          <a:p>
+            <a:pPr algn="ctr"/>
+            <a:endParaRPr lang="en-US"/>
+          </a:p>
+        </p:txBody>
+      </p:sp>
+      <p:sp>
+        <p:nvSpPr>
+          <p:cNvPr id="10" name="TextBox 9">
+            <a:extLst>
+              <a:ext uri="{FF2B5EF4-FFF2-40B4-BE49-F238E27FC236}">
+                <a16:creationId xmlns:a16="http://schemas.microsoft.com/office/drawing/2014/main" id="{32842554-1794-4910-9541-C1F1013E70BB}"/>
+              </a:ext>
+            </a:extLst>
+          </p:cNvPr>
+          <p:cNvSpPr txBox="1"/>
+          <p:nvPr/>
+        </p:nvSpPr>
+        <p:spPr>
+          <a:xfrm>
+            <a:off x="7735958" y="443883"/>
+            <a:ext cx="671979" cy="369332"/>
+          </a:xfrm>
+          <a:prstGeom prst="rect">
+            <a:avLst/>
+          </a:prstGeom>
+          <a:noFill/>
+        </p:spPr>
+        <p:txBody>
+          <a:bodyPr wrap="none" rtlCol="0">
+            <a:spAutoFit/>
+          </a:bodyPr>
+          <a:lstStyle/>
+          <a:p>
+            <a:r>
+              <a:rPr lang="es-MX" dirty="0">
+                <a:solidFill>
+                  <a:schemeClr val="bg1">
+                    <a:lumMod val="95000"/>
+                  </a:schemeClr>
+                </a:solidFill>
+              </a:rPr>
+              <a:t>nodo</a:t>
+            </a:r>
+            <a:endParaRPr lang="en-US" dirty="0">
+              <a:solidFill>
+                <a:schemeClr val="bg1">
+                  <a:lumMod val="95000"/>
+                </a:schemeClr>
+              </a:solidFill>
+            </a:endParaRPr>
+          </a:p>
+        </p:txBody>
+      </p:sp>
+      <p:cxnSp>
+        <p:nvCxnSpPr>
+          <p:cNvPr id="12" name="Straight Arrow Connector 11">
+            <a:extLst>
+              <a:ext uri="{FF2B5EF4-FFF2-40B4-BE49-F238E27FC236}">
+                <a16:creationId xmlns:a16="http://schemas.microsoft.com/office/drawing/2014/main" id="{6394194C-610B-40A1-B8DC-08161EDDB758}"/>
+              </a:ext>
+            </a:extLst>
+          </p:cNvPr>
+          <p:cNvCxnSpPr/>
+          <p:nvPr/>
+        </p:nvCxnSpPr>
+        <p:spPr>
+          <a:xfrm flipH="1">
+            <a:off x="6906827" y="715561"/>
+            <a:ext cx="727969" cy="332004"/>
+          </a:xfrm>
+          <a:prstGeom prst="straightConnector1">
+            <a:avLst/>
+          </a:prstGeom>
+          <a:ln w="19050">
+            <a:solidFill>
+              <a:schemeClr val="bg1">
+                <a:lumMod val="95000"/>
+              </a:schemeClr>
+            </a:solidFill>
+            <a:tailEnd type="triangle"/>
+          </a:ln>
+        </p:spPr>
+        <p:style>
+          <a:lnRef idx="1">
+            <a:schemeClr val="accent1"/>
+          </a:lnRef>
+          <a:fillRef idx="0">
+            <a:schemeClr val="accent1"/>
+          </a:fillRef>
+          <a:effectRef idx="0">
+            <a:schemeClr val="accent1"/>
+          </a:effectRef>
+          <a:fontRef idx="minor">
+            <a:schemeClr val="tx1"/>
+          </a:fontRef>
+        </p:style>
+      </p:cxnSp>
+    </p:spTree>
+    <p:extLst>
+      <p:ext uri="{BB962C8B-B14F-4D97-AF65-F5344CB8AC3E}">
+        <p14:creationId xmlns:p14="http://schemas.microsoft.com/office/powerpoint/2010/main" val="4016029081"/>
+      </p:ext>
+    </p:extLst>
+  </p:cSld>
+  <p:clrMapOvr>
+    <a:masterClrMapping/>
+  </p:clrMapOvr>
+  <p:timing>
+    <p:tnLst>
+      <p:par>
+        <p:cTn id="1" dur="indefinite" restart="never" nodeType="tmRoot">
+          <p:childTnLst>
+            <p:seq concurrent="1" nextAc="seek">
+              <p:cTn id="2" dur="indefinite" nodeType="mainSeq">
+                <p:childTnLst>
+                  <p:par>
+                    <p:cTn id="3" fill="hold">
+                      <p:stCondLst>
+                        <p:cond delay="indefinite"/>
+                      </p:stCondLst>
+                      <p:childTnLst>
+                        <p:par>
+                          <p:cTn id="4" fill="hold">
+                            <p:stCondLst>
+                              <p:cond delay="0"/>
+                            </p:stCondLst>
+                            <p:childTnLst>
+                              <p:par>
+                                <p:cTn id="5" presetID="1" presetClass="entr" presetSubtype="0" fill="hold" grpId="0" nodeType="clickEffect">
+                                  <p:stCondLst>
+                                    <p:cond delay="0"/>
+                                  </p:stCondLst>
+                                  <p:childTnLst>
+                                    <p:set>
+                                      <p:cBhvr>
+                                        <p:cTn id="6" dur="1" fill="hold">
+                                          <p:stCondLst>
+                                            <p:cond delay="0"/>
+                                          </p:stCondLst>
+                                        </p:cTn>
+                                        <p:tgtEl>
+                                          <p:spTgt spid="9"/>
+                                        </p:tgtEl>
+                                        <p:attrNameLst>
+                                          <p:attrName>style.visibility</p:attrName>
+                                        </p:attrNameLst>
+                                      </p:cBhvr>
+                                      <p:to>
+                                        <p:strVal val="visible"/>
+                                      </p:to>
+                                    </p:set>
+                                  </p:childTnLst>
+                                </p:cTn>
+                              </p:par>
+                            </p:childTnLst>
+                          </p:cTn>
+                        </p:par>
+                      </p:childTnLst>
+                    </p:cTn>
+                  </p:par>
+                  <p:par>
+                    <p:cTn id="7" fill="hold">
+                      <p:stCondLst>
+                        <p:cond delay="indefinite"/>
+                      </p:stCondLst>
+                      <p:childTnLst>
+                        <p:par>
+                          <p:cTn id="8" fill="hold">
+                            <p:stCondLst>
+                              <p:cond delay="0"/>
+                            </p:stCondLst>
+                            <p:childTnLst>
+                              <p:par>
+                                <p:cTn id="9" presetID="1" presetClass="entr" presetSubtype="0" fill="hold" grpId="0" nodeType="clickEffect">
+                                  <p:stCondLst>
+                                    <p:cond delay="0"/>
+                                  </p:stCondLst>
+                                  <p:childTnLst>
+                                    <p:set>
+                                      <p:cBhvr>
+                                        <p:cTn id="10" dur="1" fill="hold">
+                                          <p:stCondLst>
+                                            <p:cond delay="0"/>
+                                          </p:stCondLst>
+                                        </p:cTn>
+                                        <p:tgtEl>
+                                          <p:spTgt spid="10"/>
+                                        </p:tgtEl>
+                                        <p:attrNameLst>
+                                          <p:attrName>style.visibility</p:attrName>
+                                        </p:attrNameLst>
+                                      </p:cBhvr>
+                                      <p:to>
+                                        <p:strVal val="visible"/>
+                                      </p:to>
+                                    </p:set>
+                                  </p:childTnLst>
+                                </p:cTn>
+                              </p:par>
+                              <p:par>
+                                <p:cTn id="11" presetID="1" presetClass="entr" presetSubtype="0" fill="hold" nodeType="withEffect">
+                                  <p:stCondLst>
+                                    <p:cond delay="0"/>
+                                  </p:stCondLst>
+                                  <p:childTnLst>
+                                    <p:set>
+                                      <p:cBhvr>
+                                        <p:cTn id="12" dur="1" fill="hold">
+                                          <p:stCondLst>
+                                            <p:cond delay="0"/>
+                                          </p:stCondLst>
+                                        </p:cTn>
+                                        <p:tgtEl>
+                                          <p:spTgt spid="12"/>
+                                        </p:tgtEl>
+                                        <p:attrNameLst>
+                                          <p:attrName>style.visibility</p:attrName>
+                                        </p:attrNameLst>
+                                      </p:cBhvr>
+                                      <p:to>
+                                        <p:strVal val="visible"/>
+                                      </p:to>
+                                    </p:set>
+                                  </p:childTnLst>
+                                </p:cTn>
+                              </p:par>
+                            </p:childTnLst>
+                          </p:cTn>
+                        </p:par>
+                      </p:childTnLst>
+                    </p:cTn>
+                  </p:par>
+                </p:childTnLst>
+              </p:cTn>
+              <p:prevCondLst>
+                <p:cond evt="onPrev" delay="0">
+                  <p:tgtEl>
+                    <p:sldTgt/>
+                  </p:tgtEl>
+                </p:cond>
+              </p:prevCondLst>
+              <p:nextCondLst>
+                <p:cond evt="onNext" delay="0">
+                  <p:tgtEl>
+                    <p:sldTgt/>
+                  </p:tgtEl>
+                </p:cond>
+              </p:nextCondLst>
+            </p:seq>
+          </p:childTnLst>
+        </p:cTn>
+      </p:par>
+    </p:tnLst>
+    <p:bldLst>
+      <p:bldP spid="9" grpId="0" animBg="1"/>
+      <p:bldP spid="10" grpId="0"/>
+    </p:bldLst>
+  </p:timing>
+</p:sld>
+</file>
+
+<file path=ppt/slides/slide4.xml><?xml version="1.0" encoding="utf-8"?>
+<p:sld xmlns:a="http://schemas.openxmlformats.org/drawingml/2006/main" xmlns:r="http://schemas.openxmlformats.org/officeDocument/2006/relationships" xmlns:p="http://schemas.openxmlformats.org/presentationml/2006/main">
+  <p:cSld>
+    <p:bg>
+      <p:bgPr>
+        <a:solidFill>
+          <a:schemeClr val="tx1"/>
+        </a:solidFill>
+        <a:effectLst/>
+      </p:bgPr>
+    </p:bg>
+    <p:spTree>
+      <p:nvGrpSpPr>
+        <p:cNvPr id="1" name=""/>
+        <p:cNvGrpSpPr/>
+        <p:nvPr/>
+      </p:nvGrpSpPr>
+      <p:grpSpPr>
+        <a:xfrm>
+          <a:off x="0" y="0"/>
+          <a:ext cx="0" cy="0"/>
+          <a:chOff x="0" y="0"/>
+          <a:chExt cx="0" cy="0"/>
+        </a:xfrm>
+      </p:grpSpPr>
+      <p:sp>
+        <p:nvSpPr>
+          <p:cNvPr id="8" name="TextBox 7">
+            <a:extLst>
+              <a:ext uri="{FF2B5EF4-FFF2-40B4-BE49-F238E27FC236}">
+                <a16:creationId xmlns:a16="http://schemas.microsoft.com/office/drawing/2014/main" id="{D43F8E2D-B396-4336-AE4E-0C78A348891B}"/>
+              </a:ext>
+            </a:extLst>
+          </p:cNvPr>
+          <p:cNvSpPr txBox="1"/>
+          <p:nvPr/>
+        </p:nvSpPr>
+        <p:spPr>
+          <a:xfrm>
+            <a:off x="5619565" y="2672178"/>
+            <a:ext cx="1081232" cy="707886"/>
+          </a:xfrm>
+          <a:prstGeom prst="rect">
+            <a:avLst/>
+          </a:prstGeom>
+          <a:noFill/>
+        </p:spPr>
+        <p:txBody>
+          <a:bodyPr wrap="square" rtlCol="0">
+            <a:spAutoFit/>
+          </a:bodyPr>
+          <a:lstStyle/>
+          <a:p>
+            <a:r>
+              <a:rPr lang="es-MX" sz="4000" dirty="0">
+                <a:solidFill>
+                  <a:schemeClr val="bg1">
+                    <a:lumMod val="95000"/>
+                  </a:schemeClr>
+                </a:solidFill>
+                <a:latin typeface="DengXian" panose="02010600030101010101" pitchFamily="2" charset="-122"/>
+                <a:ea typeface="DengXian" panose="02010600030101010101" pitchFamily="2" charset="-122"/>
+              </a:rPr>
+              <a:t>32</a:t>
+            </a:r>
+            <a:endParaRPr lang="en-US" sz="300" dirty="0">
+              <a:solidFill>
+                <a:schemeClr val="bg1">
+                  <a:lumMod val="95000"/>
+                </a:schemeClr>
+              </a:solidFill>
+              <a:latin typeface="DengXian" panose="02010600030101010101" pitchFamily="2" charset="-122"/>
+              <a:ea typeface="DengXian" panose="02010600030101010101" pitchFamily="2" charset="-122"/>
+            </a:endParaRPr>
+          </a:p>
+        </p:txBody>
+      </p:sp>
+      <p:sp>
+        <p:nvSpPr>
+          <p:cNvPr id="9" name="Rectangle: Rounded Corners 8">
+            <a:extLst>
+              <a:ext uri="{FF2B5EF4-FFF2-40B4-BE49-F238E27FC236}">
+                <a16:creationId xmlns:a16="http://schemas.microsoft.com/office/drawing/2014/main" id="{41D1259F-29E9-461E-8CE1-1740039D217F}"/>
+              </a:ext>
+            </a:extLst>
+          </p:cNvPr>
+          <p:cNvSpPr/>
+          <p:nvPr/>
+        </p:nvSpPr>
+        <p:spPr>
+          <a:xfrm>
+            <a:off x="5379868" y="2485746"/>
+            <a:ext cx="1143376" cy="1127465"/>
+          </a:xfrm>
+          <a:prstGeom prst="roundRect">
+            <a:avLst/>
+          </a:prstGeom>
+          <a:noFill/>
+          <a:ln w="38100" cap="flat" cmpd="sng" algn="ctr">
+            <a:solidFill>
+              <a:schemeClr val="accent1"/>
+            </a:solidFill>
+            <a:prstDash val="solid"/>
+            <a:round/>
+            <a:headEnd type="none" w="med" len="med"/>
+            <a:tailEnd type="none" w="med" len="med"/>
+          </a:ln>
+        </p:spPr>
+        <p:style>
+          <a:lnRef idx="0">
+            <a:scrgbClr r="0" g="0" b="0"/>
+          </a:lnRef>
+          <a:fillRef idx="0">
+            <a:scrgbClr r="0" g="0" b="0"/>
+          </a:fillRef>
+          <a:effectRef idx="0">
+            <a:scrgbClr r="0" g="0" b="0"/>
+          </a:effectRef>
+          <a:fontRef idx="minor">
+            <a:schemeClr val="accent1"/>
+          </a:fontRef>
+        </p:style>
+        <p:txBody>
+          <a:bodyPr rtlCol="0" anchor="ctr"/>
+          <a:lstStyle/>
+          <a:p>
+            <a:pPr algn="ctr"/>
+            <a:endParaRPr lang="en-US" sz="300"/>
+          </a:p>
+        </p:txBody>
+      </p:sp>
+      <p:sp>
+        <p:nvSpPr>
+          <p:cNvPr id="6" name="TextBox 5">
+            <a:extLst>
+              <a:ext uri="{FF2B5EF4-FFF2-40B4-BE49-F238E27FC236}">
+                <a16:creationId xmlns:a16="http://schemas.microsoft.com/office/drawing/2014/main" id="{3E80A9D8-7A0C-42F8-B5C9-7B643FEB5AFB}"/>
+              </a:ext>
+            </a:extLst>
+          </p:cNvPr>
+          <p:cNvSpPr txBox="1"/>
+          <p:nvPr/>
+        </p:nvSpPr>
+        <p:spPr>
+          <a:xfrm>
+            <a:off x="3657600" y="4314547"/>
+            <a:ext cx="1081232" cy="707886"/>
+          </a:xfrm>
+          <a:prstGeom prst="rect">
+            <a:avLst/>
+          </a:prstGeom>
+          <a:noFill/>
+        </p:spPr>
+        <p:txBody>
+          <a:bodyPr wrap="square" rtlCol="0">
+            <a:spAutoFit/>
+          </a:bodyPr>
+          <a:lstStyle/>
+          <a:p>
+            <a:r>
+              <a:rPr lang="es-MX" sz="4000" dirty="0">
+                <a:solidFill>
+                  <a:schemeClr val="bg1">
+                    <a:lumMod val="95000"/>
+                  </a:schemeClr>
+                </a:solidFill>
+                <a:latin typeface="DengXian" panose="02010600030101010101" pitchFamily="2" charset="-122"/>
+                <a:ea typeface="DengXian" panose="02010600030101010101" pitchFamily="2" charset="-122"/>
+              </a:rPr>
+              <a:t>24</a:t>
+            </a:r>
+            <a:endParaRPr lang="en-US" sz="300" dirty="0">
+              <a:solidFill>
+                <a:schemeClr val="bg1">
+                  <a:lumMod val="95000"/>
+                </a:schemeClr>
+              </a:solidFill>
+              <a:latin typeface="DengXian" panose="02010600030101010101" pitchFamily="2" charset="-122"/>
+              <a:ea typeface="DengXian" panose="02010600030101010101" pitchFamily="2" charset="-122"/>
+            </a:endParaRPr>
+          </a:p>
+        </p:txBody>
+      </p:sp>
+      <p:sp>
+        <p:nvSpPr>
+          <p:cNvPr id="7" name="Rectangle: Rounded Corners 6">
+            <a:extLst>
+              <a:ext uri="{FF2B5EF4-FFF2-40B4-BE49-F238E27FC236}">
+                <a16:creationId xmlns:a16="http://schemas.microsoft.com/office/drawing/2014/main" id="{2008FCBE-56F0-4B1B-A5C5-3DEE88BE1C30}"/>
+              </a:ext>
+            </a:extLst>
+          </p:cNvPr>
+          <p:cNvSpPr/>
+          <p:nvPr/>
+        </p:nvSpPr>
+        <p:spPr>
+          <a:xfrm>
+            <a:off x="3417903" y="4128115"/>
+            <a:ext cx="1143376" cy="1127465"/>
+          </a:xfrm>
+          <a:prstGeom prst="roundRect">
+            <a:avLst/>
+          </a:prstGeom>
+          <a:noFill/>
+          <a:ln w="38100" cap="flat" cmpd="sng" algn="ctr">
+            <a:solidFill>
+              <a:schemeClr val="accent1"/>
+            </a:solidFill>
+            <a:prstDash val="solid"/>
+            <a:round/>
+            <a:headEnd type="none" w="med" len="med"/>
+            <a:tailEnd type="none" w="med" len="med"/>
+          </a:ln>
+        </p:spPr>
+        <p:style>
+          <a:lnRef idx="0">
+            <a:scrgbClr r="0" g="0" b="0"/>
+          </a:lnRef>
+          <a:fillRef idx="0">
+            <a:scrgbClr r="0" g="0" b="0"/>
+          </a:fillRef>
+          <a:effectRef idx="0">
+            <a:scrgbClr r="0" g="0" b="0"/>
+          </a:effectRef>
+          <a:fontRef idx="minor">
+            <a:schemeClr val="accent1"/>
+          </a:fontRef>
+        </p:style>
+        <p:txBody>
+          <a:bodyPr rtlCol="0" anchor="ctr"/>
+          <a:lstStyle/>
+          <a:p>
+            <a:pPr algn="ctr"/>
+            <a:endParaRPr lang="en-US" sz="300"/>
+          </a:p>
+        </p:txBody>
+      </p:sp>
+      <p:sp>
+        <p:nvSpPr>
+          <p:cNvPr id="11" name="TextBox 10">
+            <a:extLst>
+              <a:ext uri="{FF2B5EF4-FFF2-40B4-BE49-F238E27FC236}">
+                <a16:creationId xmlns:a16="http://schemas.microsoft.com/office/drawing/2014/main" id="{D3F2F949-22BE-4AAC-BEE0-58BC7272B40E}"/>
+              </a:ext>
+            </a:extLst>
+          </p:cNvPr>
+          <p:cNvSpPr txBox="1"/>
+          <p:nvPr/>
+        </p:nvSpPr>
+        <p:spPr>
+          <a:xfrm>
+            <a:off x="7298732" y="4314547"/>
+            <a:ext cx="1081232" cy="707886"/>
+          </a:xfrm>
+          <a:prstGeom prst="rect">
+            <a:avLst/>
+          </a:prstGeom>
+          <a:noFill/>
+        </p:spPr>
+        <p:txBody>
+          <a:bodyPr wrap="square" rtlCol="0">
+            <a:spAutoFit/>
+          </a:bodyPr>
+          <a:lstStyle/>
+          <a:p>
+            <a:r>
+              <a:rPr lang="es-MX" sz="4000" dirty="0">
+                <a:solidFill>
+                  <a:schemeClr val="bg1">
+                    <a:lumMod val="95000"/>
+                  </a:schemeClr>
+                </a:solidFill>
+                <a:latin typeface="DengXian" panose="02010600030101010101" pitchFamily="2" charset="-122"/>
+                <a:ea typeface="DengXian" panose="02010600030101010101" pitchFamily="2" charset="-122"/>
+              </a:rPr>
+              <a:t>36</a:t>
+            </a:r>
+            <a:endParaRPr lang="en-US" sz="300" dirty="0">
+              <a:solidFill>
+                <a:schemeClr val="bg1">
+                  <a:lumMod val="95000"/>
+                </a:schemeClr>
+              </a:solidFill>
+              <a:latin typeface="DengXian" panose="02010600030101010101" pitchFamily="2" charset="-122"/>
+              <a:ea typeface="DengXian" panose="02010600030101010101" pitchFamily="2" charset="-122"/>
+            </a:endParaRPr>
+          </a:p>
+        </p:txBody>
+      </p:sp>
+      <p:sp>
+        <p:nvSpPr>
+          <p:cNvPr id="13" name="Rectangle: Rounded Corners 12">
+            <a:extLst>
+              <a:ext uri="{FF2B5EF4-FFF2-40B4-BE49-F238E27FC236}">
+                <a16:creationId xmlns:a16="http://schemas.microsoft.com/office/drawing/2014/main" id="{06AB9182-CB57-463F-9A71-A5EC93984294}"/>
+              </a:ext>
+            </a:extLst>
+          </p:cNvPr>
+          <p:cNvSpPr/>
+          <p:nvPr/>
+        </p:nvSpPr>
+        <p:spPr>
+          <a:xfrm>
+            <a:off x="7059035" y="4128115"/>
+            <a:ext cx="1143376" cy="1127465"/>
+          </a:xfrm>
+          <a:prstGeom prst="roundRect">
+            <a:avLst/>
+          </a:prstGeom>
+          <a:noFill/>
+          <a:ln w="38100" cap="flat" cmpd="sng" algn="ctr">
+            <a:solidFill>
+              <a:schemeClr val="accent1"/>
+            </a:solidFill>
+            <a:prstDash val="solid"/>
+            <a:round/>
+            <a:headEnd type="none" w="med" len="med"/>
+            <a:tailEnd type="none" w="med" len="med"/>
+          </a:ln>
+        </p:spPr>
+        <p:style>
+          <a:lnRef idx="0">
+            <a:scrgbClr r="0" g="0" b="0"/>
+          </a:lnRef>
+          <a:fillRef idx="0">
+            <a:scrgbClr r="0" g="0" b="0"/>
+          </a:fillRef>
+          <a:effectRef idx="0">
+            <a:scrgbClr r="0" g="0" b="0"/>
+          </a:effectRef>
+          <a:fontRef idx="minor">
+            <a:schemeClr val="accent1"/>
+          </a:fontRef>
+        </p:style>
+        <p:txBody>
+          <a:bodyPr rtlCol="0" anchor="ctr"/>
+          <a:lstStyle/>
+          <a:p>
+            <a:pPr algn="ctr"/>
+            <a:endParaRPr lang="en-US" sz="300"/>
+          </a:p>
+        </p:txBody>
+      </p:sp>
+      <p:sp>
+        <p:nvSpPr>
+          <p:cNvPr id="14" name="TextBox 13">
+            <a:extLst>
+              <a:ext uri="{FF2B5EF4-FFF2-40B4-BE49-F238E27FC236}">
+                <a16:creationId xmlns:a16="http://schemas.microsoft.com/office/drawing/2014/main" id="{85DEB454-141A-4035-8B76-E6C885B05310}"/>
+              </a:ext>
+            </a:extLst>
+          </p:cNvPr>
+          <p:cNvSpPr txBox="1"/>
+          <p:nvPr/>
+        </p:nvSpPr>
+        <p:spPr>
+          <a:xfrm>
+            <a:off x="7378631" y="967665"/>
+            <a:ext cx="1081232" cy="707886"/>
+          </a:xfrm>
+          <a:prstGeom prst="rect">
+            <a:avLst/>
+          </a:prstGeom>
+          <a:noFill/>
+        </p:spPr>
+        <p:txBody>
+          <a:bodyPr wrap="square" rtlCol="0">
+            <a:spAutoFit/>
+          </a:bodyPr>
+          <a:lstStyle/>
+          <a:p>
+            <a:r>
+              <a:rPr lang="es-MX" sz="4000" dirty="0">
+                <a:solidFill>
+                  <a:schemeClr val="bg1">
+                    <a:lumMod val="95000"/>
+                  </a:schemeClr>
+                </a:solidFill>
+                <a:latin typeface="DengXian" panose="02010600030101010101" pitchFamily="2" charset="-122"/>
+                <a:ea typeface="DengXian" panose="02010600030101010101" pitchFamily="2" charset="-122"/>
+              </a:rPr>
+              <a:t>43</a:t>
+            </a:r>
+            <a:endParaRPr lang="en-US" sz="300" dirty="0">
+              <a:solidFill>
+                <a:schemeClr val="bg1">
+                  <a:lumMod val="95000"/>
+                </a:schemeClr>
+              </a:solidFill>
+              <a:latin typeface="DengXian" panose="02010600030101010101" pitchFamily="2" charset="-122"/>
+              <a:ea typeface="DengXian" panose="02010600030101010101" pitchFamily="2" charset="-122"/>
+            </a:endParaRPr>
+          </a:p>
+        </p:txBody>
+      </p:sp>
+      <p:sp>
+        <p:nvSpPr>
+          <p:cNvPr id="15" name="Rectangle: Rounded Corners 14">
+            <a:extLst>
+              <a:ext uri="{FF2B5EF4-FFF2-40B4-BE49-F238E27FC236}">
+                <a16:creationId xmlns:a16="http://schemas.microsoft.com/office/drawing/2014/main" id="{338DD274-81A7-433A-9A5F-3C9279D717FF}"/>
+              </a:ext>
+            </a:extLst>
+          </p:cNvPr>
+          <p:cNvSpPr/>
+          <p:nvPr/>
+        </p:nvSpPr>
+        <p:spPr>
+          <a:xfrm>
+            <a:off x="7138934" y="781233"/>
+            <a:ext cx="1143376" cy="1127465"/>
+          </a:xfrm>
+          <a:prstGeom prst="roundRect">
+            <a:avLst/>
+          </a:prstGeom>
+          <a:noFill/>
+          <a:ln w="38100" cap="flat" cmpd="sng" algn="ctr">
+            <a:solidFill>
+              <a:schemeClr val="accent1"/>
+            </a:solidFill>
+            <a:prstDash val="solid"/>
+            <a:round/>
+            <a:headEnd type="none" w="med" len="med"/>
+            <a:tailEnd type="none" w="med" len="med"/>
+          </a:ln>
+        </p:spPr>
+        <p:style>
+          <a:lnRef idx="0">
+            <a:scrgbClr r="0" g="0" b="0"/>
+          </a:lnRef>
+          <a:fillRef idx="0">
+            <a:scrgbClr r="0" g="0" b="0"/>
+          </a:fillRef>
+          <a:effectRef idx="0">
+            <a:scrgbClr r="0" g="0" b="0"/>
+          </a:effectRef>
+          <a:fontRef idx="minor">
+            <a:schemeClr val="accent1"/>
+          </a:fontRef>
+        </p:style>
+        <p:txBody>
+          <a:bodyPr rtlCol="0" anchor="ctr"/>
+          <a:lstStyle/>
+          <a:p>
+            <a:pPr algn="ctr"/>
+            <a:endParaRPr lang="en-US" sz="300"/>
+          </a:p>
+        </p:txBody>
+      </p:sp>
+      <p:cxnSp>
+        <p:nvCxnSpPr>
+          <p:cNvPr id="3" name="Straight Arrow Connector 2">
+            <a:extLst>
+              <a:ext uri="{FF2B5EF4-FFF2-40B4-BE49-F238E27FC236}">
+                <a16:creationId xmlns:a16="http://schemas.microsoft.com/office/drawing/2014/main" id="{EBAA6433-2305-4EC2-9301-D0BEAFC84BD6}"/>
+              </a:ext>
+            </a:extLst>
+          </p:cNvPr>
+          <p:cNvCxnSpPr/>
+          <p:nvPr/>
+        </p:nvCxnSpPr>
+        <p:spPr>
+          <a:xfrm flipH="1">
+            <a:off x="4561279" y="3693111"/>
+            <a:ext cx="649913" cy="435004"/>
+          </a:xfrm>
+          <a:prstGeom prst="straightConnector1">
+            <a:avLst/>
+          </a:prstGeom>
+          <a:ln>
+            <a:tailEnd type="triangle"/>
+          </a:ln>
+        </p:spPr>
+        <p:style>
+          <a:lnRef idx="1">
+            <a:schemeClr val="accent1"/>
+          </a:lnRef>
+          <a:fillRef idx="0">
+            <a:schemeClr val="accent1"/>
+          </a:fillRef>
+          <a:effectRef idx="0">
+            <a:schemeClr val="accent1"/>
+          </a:effectRef>
+          <a:fontRef idx="minor">
+            <a:schemeClr val="tx1"/>
+          </a:fontRef>
+        </p:style>
+      </p:cxnSp>
+      <p:cxnSp>
+        <p:nvCxnSpPr>
+          <p:cNvPr id="16" name="Straight Arrow Connector 15">
+            <a:extLst>
+              <a:ext uri="{FF2B5EF4-FFF2-40B4-BE49-F238E27FC236}">
+                <a16:creationId xmlns:a16="http://schemas.microsoft.com/office/drawing/2014/main" id="{CDA57361-56E3-4940-A129-0D4E66AC0EDA}"/>
+              </a:ext>
+            </a:extLst>
+          </p:cNvPr>
+          <p:cNvCxnSpPr>
+            <a:cxnSpLocks/>
+          </p:cNvCxnSpPr>
+          <p:nvPr/>
+        </p:nvCxnSpPr>
+        <p:spPr>
+          <a:xfrm>
+            <a:off x="6601300" y="3662039"/>
+            <a:ext cx="457735" cy="466076"/>
+          </a:xfrm>
+          <a:prstGeom prst="straightConnector1">
+            <a:avLst/>
+          </a:prstGeom>
+          <a:ln>
+            <a:tailEnd type="triangle"/>
+          </a:ln>
+        </p:spPr>
+        <p:style>
+          <a:lnRef idx="1">
+            <a:schemeClr val="accent1"/>
+          </a:lnRef>
+          <a:fillRef idx="0">
+            <a:schemeClr val="accent1"/>
+          </a:fillRef>
+          <a:effectRef idx="0">
+            <a:schemeClr val="accent1"/>
+          </a:effectRef>
+          <a:fontRef idx="minor">
+            <a:schemeClr val="tx1"/>
+          </a:fontRef>
+        </p:style>
+      </p:cxnSp>
+      <p:cxnSp>
+        <p:nvCxnSpPr>
+          <p:cNvPr id="18" name="Straight Arrow Connector 17">
+            <a:extLst>
+              <a:ext uri="{FF2B5EF4-FFF2-40B4-BE49-F238E27FC236}">
+                <a16:creationId xmlns:a16="http://schemas.microsoft.com/office/drawing/2014/main" id="{CBD18F27-0E08-424A-9798-CE86654EBBD5}"/>
+              </a:ext>
+            </a:extLst>
+          </p:cNvPr>
+          <p:cNvCxnSpPr/>
+          <p:nvPr/>
+        </p:nvCxnSpPr>
+        <p:spPr>
+          <a:xfrm flipH="1">
+            <a:off x="6601300" y="1908698"/>
+            <a:ext cx="537634" cy="479395"/>
+          </a:xfrm>
+          <a:prstGeom prst="straightConnector1">
+            <a:avLst/>
+          </a:prstGeom>
+          <a:ln>
+            <a:tailEnd type="triangle"/>
+          </a:ln>
+        </p:spPr>
+        <p:style>
+          <a:lnRef idx="1">
+            <a:schemeClr val="accent1"/>
+          </a:lnRef>
+          <a:fillRef idx="0">
+            <a:schemeClr val="accent1"/>
+          </a:fillRef>
+          <a:effectRef idx="0">
+            <a:schemeClr val="accent1"/>
+          </a:effectRef>
+          <a:fontRef idx="minor">
+            <a:schemeClr val="tx1"/>
+          </a:fontRef>
+        </p:style>
+      </p:cxnSp>
+    </p:spTree>
+    <p:extLst>
+      <p:ext uri="{BB962C8B-B14F-4D97-AF65-F5344CB8AC3E}">
+        <p14:creationId xmlns:p14="http://schemas.microsoft.com/office/powerpoint/2010/main" val="1571061813"/>
+      </p:ext>
+    </p:extLst>
+  </p:cSld>
+  <p:clrMapOvr>
+    <a:masterClrMapping/>
+  </p:clrMapOvr>
+  <p:timing>
+    <p:tnLst>
+      <p:par>
+        <p:cTn id="1" dur="indefinite" restart="never" nodeType="tmRoot">
+          <p:childTnLst>
+            <p:seq concurrent="1" nextAc="seek">
+              <p:cTn id="2" dur="indefinite" nodeType="mainSeq">
+                <p:childTnLst>
+                  <p:par>
+                    <p:cTn id="3" fill="hold">
+                      <p:stCondLst>
+                        <p:cond delay="indefinite"/>
+                      </p:stCondLst>
+                      <p:childTnLst>
+                        <p:par>
+                          <p:cTn id="4" fill="hold">
+                            <p:stCondLst>
+                              <p:cond delay="0"/>
+                            </p:stCondLst>
+                            <p:childTnLst>
+                              <p:par>
+                                <p:cTn id="5" presetID="1" presetClass="entr" presetSubtype="0" fill="hold" grpId="0" nodeType="clickEffect">
+                                  <p:stCondLst>
+                                    <p:cond delay="0"/>
+                                  </p:stCondLst>
+                                  <p:childTnLst>
+                                    <p:set>
+                                      <p:cBhvr>
+                                        <p:cTn id="6" dur="1" fill="hold">
+                                          <p:stCondLst>
+                                            <p:cond delay="0"/>
+                                          </p:stCondLst>
+                                        </p:cTn>
+                                        <p:tgtEl>
+                                          <p:spTgt spid="6"/>
+                                        </p:tgtEl>
+                                        <p:attrNameLst>
+                                          <p:attrName>style.visibility</p:attrName>
+                                        </p:attrNameLst>
+                                      </p:cBhvr>
+                                      <p:to>
+                                        <p:strVal val="visible"/>
+                                      </p:to>
+                                    </p:set>
+                                  </p:childTnLst>
+                                </p:cTn>
+                              </p:par>
+                              <p:par>
+                                <p:cTn id="7" presetID="1" presetClass="entr" presetSubtype="0" fill="hold" grpId="0" nodeType="withEffect">
+                                  <p:stCondLst>
+                                    <p:cond delay="0"/>
+                                  </p:stCondLst>
+                                  <p:childTnLst>
+                                    <p:set>
+                                      <p:cBhvr>
+                                        <p:cTn id="8" dur="1" fill="hold">
+                                          <p:stCondLst>
+                                            <p:cond delay="0"/>
+                                          </p:stCondLst>
+                                        </p:cTn>
+                                        <p:tgtEl>
+                                          <p:spTgt spid="7"/>
+                                        </p:tgtEl>
+                                        <p:attrNameLst>
+                                          <p:attrName>style.visibility</p:attrName>
+                                        </p:attrNameLst>
+                                      </p:cBhvr>
+                                      <p:to>
+                                        <p:strVal val="visible"/>
+                                      </p:to>
+                                    </p:set>
+                                  </p:childTnLst>
+                                </p:cTn>
+                              </p:par>
+                              <p:par>
+                                <p:cTn id="9" presetID="1" presetClass="entr" presetSubtype="0" fill="hold" grpId="0" nodeType="withEffect">
+                                  <p:stCondLst>
+                                    <p:cond delay="0"/>
+                                  </p:stCondLst>
+                                  <p:childTnLst>
+                                    <p:set>
+                                      <p:cBhvr>
+                                        <p:cTn id="10" dur="1" fill="hold">
+                                          <p:stCondLst>
+                                            <p:cond delay="0"/>
+                                          </p:stCondLst>
+                                        </p:cTn>
+                                        <p:tgtEl>
+                                          <p:spTgt spid="11"/>
+                                        </p:tgtEl>
+                                        <p:attrNameLst>
+                                          <p:attrName>style.visibility</p:attrName>
+                                        </p:attrNameLst>
+                                      </p:cBhvr>
+                                      <p:to>
+                                        <p:strVal val="visible"/>
+                                      </p:to>
+                                    </p:set>
+                                  </p:childTnLst>
+                                </p:cTn>
+                              </p:par>
+                              <p:par>
+                                <p:cTn id="11" presetID="1" presetClass="entr" presetSubtype="0" fill="hold" grpId="0" nodeType="withEffect">
+                                  <p:stCondLst>
+                                    <p:cond delay="0"/>
+                                  </p:stCondLst>
+                                  <p:childTnLst>
+                                    <p:set>
+                                      <p:cBhvr>
+                                        <p:cTn id="12" dur="1" fill="hold">
+                                          <p:stCondLst>
+                                            <p:cond delay="0"/>
+                                          </p:stCondLst>
+                                        </p:cTn>
+                                        <p:tgtEl>
+                                          <p:spTgt spid="13"/>
+                                        </p:tgtEl>
+                                        <p:attrNameLst>
+                                          <p:attrName>style.visibility</p:attrName>
+                                        </p:attrNameLst>
+                                      </p:cBhvr>
+                                      <p:to>
+                                        <p:strVal val="visible"/>
+                                      </p:to>
+                                    </p:set>
+                                  </p:childTnLst>
+                                </p:cTn>
+                              </p:par>
+                              <p:par>
+                                <p:cTn id="13" presetID="1" presetClass="entr" presetSubtype="0" fill="hold" nodeType="withEffect">
+                                  <p:stCondLst>
+                                    <p:cond delay="0"/>
+                                  </p:stCondLst>
+                                  <p:childTnLst>
+                                    <p:set>
+                                      <p:cBhvr>
+                                        <p:cTn id="14" dur="1" fill="hold">
+                                          <p:stCondLst>
+                                            <p:cond delay="0"/>
+                                          </p:stCondLst>
+                                        </p:cTn>
+                                        <p:tgtEl>
+                                          <p:spTgt spid="3"/>
+                                        </p:tgtEl>
+                                        <p:attrNameLst>
+                                          <p:attrName>style.visibility</p:attrName>
+                                        </p:attrNameLst>
+                                      </p:cBhvr>
+                                      <p:to>
+                                        <p:strVal val="visible"/>
+                                      </p:to>
+                                    </p:set>
+                                  </p:childTnLst>
+                                </p:cTn>
+                              </p:par>
+                              <p:par>
+                                <p:cTn id="15" presetID="1" presetClass="entr" presetSubtype="0" fill="hold" nodeType="withEffect">
+                                  <p:stCondLst>
+                                    <p:cond delay="0"/>
+                                  </p:stCondLst>
+                                  <p:childTnLst>
+                                    <p:set>
+                                      <p:cBhvr>
+                                        <p:cTn id="16" dur="1" fill="hold">
+                                          <p:stCondLst>
+                                            <p:cond delay="0"/>
+                                          </p:stCondLst>
+                                        </p:cTn>
+                                        <p:tgtEl>
+                                          <p:spTgt spid="16"/>
+                                        </p:tgtEl>
+                                        <p:attrNameLst>
+                                          <p:attrName>style.visibility</p:attrName>
+                                        </p:attrNameLst>
+                                      </p:cBhvr>
+                                      <p:to>
+                                        <p:strVal val="visible"/>
+                                      </p:to>
+                                    </p:set>
+                                  </p:childTnLst>
+                                </p:cTn>
+                              </p:par>
+                            </p:childTnLst>
+                          </p:cTn>
+                        </p:par>
+                      </p:childTnLst>
+                    </p:cTn>
+                  </p:par>
+                  <p:par>
+                    <p:cTn id="17" fill="hold">
+                      <p:stCondLst>
+                        <p:cond delay="indefinite"/>
+                      </p:stCondLst>
+                      <p:childTnLst>
+                        <p:par>
+                          <p:cTn id="18" fill="hold">
+                            <p:stCondLst>
+                              <p:cond delay="0"/>
+                            </p:stCondLst>
+                            <p:childTnLst>
+                              <p:par>
+                                <p:cTn id="19" presetID="1" presetClass="entr" presetSubtype="0" fill="hold" grpId="0" nodeType="clickEffect">
+                                  <p:stCondLst>
+                                    <p:cond delay="0"/>
+                                  </p:stCondLst>
+                                  <p:childTnLst>
+                                    <p:set>
+                                      <p:cBhvr>
+                                        <p:cTn id="20" dur="1" fill="hold">
+                                          <p:stCondLst>
+                                            <p:cond delay="0"/>
+                                          </p:stCondLst>
+                                        </p:cTn>
+                                        <p:tgtEl>
+                                          <p:spTgt spid="14"/>
+                                        </p:tgtEl>
+                                        <p:attrNameLst>
+                                          <p:attrName>style.visibility</p:attrName>
+                                        </p:attrNameLst>
+                                      </p:cBhvr>
+                                      <p:to>
+                                        <p:strVal val="visible"/>
+                                      </p:to>
+                                    </p:set>
+                                  </p:childTnLst>
+                                </p:cTn>
+                              </p:par>
+                              <p:par>
+                                <p:cTn id="21" presetID="1" presetClass="entr" presetSubtype="0" fill="hold" grpId="0" nodeType="withEffect">
+                                  <p:stCondLst>
+                                    <p:cond delay="0"/>
+                                  </p:stCondLst>
+                                  <p:childTnLst>
+                                    <p:set>
+                                      <p:cBhvr>
+                                        <p:cTn id="22" dur="1" fill="hold">
+                                          <p:stCondLst>
+                                            <p:cond delay="0"/>
+                                          </p:stCondLst>
+                                        </p:cTn>
+                                        <p:tgtEl>
+                                          <p:spTgt spid="15"/>
+                                        </p:tgtEl>
+                                        <p:attrNameLst>
+                                          <p:attrName>style.visibility</p:attrName>
+                                        </p:attrNameLst>
+                                      </p:cBhvr>
+                                      <p:to>
+                                        <p:strVal val="visible"/>
+                                      </p:to>
+                                    </p:set>
+                                  </p:childTnLst>
+                                </p:cTn>
+                              </p:par>
+                              <p:par>
+                                <p:cTn id="23" presetID="1" presetClass="entr" presetSubtype="0" fill="hold" nodeType="withEffect">
+                                  <p:stCondLst>
+                                    <p:cond delay="0"/>
+                                  </p:stCondLst>
+                                  <p:childTnLst>
+                                    <p:set>
+                                      <p:cBhvr>
+                                        <p:cTn id="24" dur="1" fill="hold">
+                                          <p:stCondLst>
+                                            <p:cond delay="0"/>
+                                          </p:stCondLst>
+                                        </p:cTn>
+                                        <p:tgtEl>
+                                          <p:spTgt spid="18"/>
+                                        </p:tgtEl>
+                                        <p:attrNameLst>
+                                          <p:attrName>style.visibility</p:attrName>
+                                        </p:attrNameLst>
+                                      </p:cBhvr>
+                                      <p:to>
+                                        <p:strVal val="visible"/>
+                                      </p:to>
+                                    </p:set>
+                                  </p:childTnLst>
+                                </p:cTn>
+                              </p:par>
+                            </p:childTnLst>
+                          </p:cTn>
+                        </p:par>
+                      </p:childTnLst>
+                    </p:cTn>
+                  </p:par>
+                </p:childTnLst>
+              </p:cTn>
+              <p:prevCondLst>
+                <p:cond evt="onPrev" delay="0">
+                  <p:tgtEl>
+                    <p:sldTgt/>
+                  </p:tgtEl>
+                </p:cond>
+              </p:prevCondLst>
+              <p:nextCondLst>
+                <p:cond evt="onNext" delay="0">
+                  <p:tgtEl>
+                    <p:sldTgt/>
+                  </p:tgtEl>
+                </p:cond>
+              </p:nextCondLst>
+            </p:seq>
+          </p:childTnLst>
+        </p:cTn>
+      </p:par>
+    </p:tnLst>
+    <p:bldLst>
+      <p:bldP spid="6" grpId="0"/>
+      <p:bldP spid="7" grpId="0" animBg="1"/>
+      <p:bldP spid="11" grpId="0"/>
+      <p:bldP spid="13" grpId="0" animBg="1"/>
+      <p:bldP spid="14" grpId="0"/>
+      <p:bldP spid="15" grpId="0" animBg="1"/>
+    </p:bldLst>
+  </p:timing>
 </p:sld>
 </file>
 

</xml_diff>

<commit_message>
Tree traversal slides finished
</commit_message>
<xml_diff>
--- a/Documents/[4]Arboles_binarios-Recorrido.pptx
+++ b/Documents/[4]Arboles_binarios-Recorrido.pptx
@@ -604,6 +604,321 @@
 </file>
 
 <file path=ppt/notesSlides/notesSlide10.xml><?xml version="1.0" encoding="utf-8"?>
+<p:notes xmlns:a="http://schemas.openxmlformats.org/drawingml/2006/main" xmlns:r="http://schemas.openxmlformats.org/officeDocument/2006/relationships" xmlns:p="http://schemas.openxmlformats.org/presentationml/2006/main">
+  <p:cSld>
+    <p:spTree>
+      <p:nvGrpSpPr>
+        <p:cNvPr id="1" name=""/>
+        <p:cNvGrpSpPr/>
+        <p:nvPr/>
+      </p:nvGrpSpPr>
+      <p:grpSpPr>
+        <a:xfrm>
+          <a:off x="0" y="0"/>
+          <a:ext cx="0" cy="0"/>
+          <a:chOff x="0" y="0"/>
+          <a:chExt cx="0" cy="0"/>
+        </a:xfrm>
+      </p:grpSpPr>
+      <p:sp>
+        <p:nvSpPr>
+          <p:cNvPr id="2" name="Slide Image Placeholder 1"/>
+          <p:cNvSpPr>
+            <a:spLocks noGrp="1" noRot="1" noChangeAspect="1"/>
+          </p:cNvSpPr>
+          <p:nvPr>
+            <p:ph type="sldImg"/>
+          </p:nvPr>
+        </p:nvSpPr>
+        <p:spPr/>
+      </p:sp>
+      <p:sp>
+        <p:nvSpPr>
+          <p:cNvPr id="3" name="Notes Placeholder 2"/>
+          <p:cNvSpPr>
+            <a:spLocks noGrp="1"/>
+          </p:cNvSpPr>
+          <p:nvPr>
+            <p:ph type="body" idx="1"/>
+          </p:nvPr>
+        </p:nvSpPr>
+        <p:spPr/>
+        <p:txBody>
+          <a:bodyPr/>
+          <a:lstStyle/>
+          <a:p>
+            <a:r>
+              <a:rPr lang="es-MX" dirty="0"/>
+              <a:t>Trabajar con la raíz</a:t>
+            </a:r>
+          </a:p>
+          <a:p>
+            <a:r>
+              <a:rPr lang="es-MX" dirty="0"/>
+              <a:t>Segundo paso, una vez que hemos procesado o imprimido la raíz,</a:t>
+            </a:r>
+          </a:p>
+          <a:p>
+            <a:endParaRPr lang="es-MX" dirty="0"/>
+          </a:p>
+          <a:p>
+            <a:r>
+              <a:rPr lang="es-MX" dirty="0"/>
+              <a:t>Recorremos el subárbol izquierdo</a:t>
+            </a:r>
+          </a:p>
+          <a:p>
+            <a:endParaRPr lang="es-MX" dirty="0"/>
+          </a:p>
+          <a:p>
+            <a:r>
+              <a:rPr lang="es-MX" dirty="0"/>
+              <a:t>Recorremos el subárbol derecho</a:t>
+            </a:r>
+          </a:p>
+          <a:p>
+            <a:endParaRPr lang="es-MX" dirty="0"/>
+          </a:p>
+          <a:p>
+            <a:r>
+              <a:rPr lang="es-MX" dirty="0"/>
+              <a:t>Repetir hasta terminar de recorrer el </a:t>
+            </a:r>
+            <a:r>
+              <a:rPr lang="es-MX" dirty="0" err="1"/>
+              <a:t>arbol</a:t>
+            </a:r>
+            <a:endParaRPr lang="en-US" dirty="0"/>
+          </a:p>
+        </p:txBody>
+      </p:sp>
+      <p:sp>
+        <p:nvSpPr>
+          <p:cNvPr id="4" name="Slide Number Placeholder 3"/>
+          <p:cNvSpPr>
+            <a:spLocks noGrp="1"/>
+          </p:cNvSpPr>
+          <p:nvPr>
+            <p:ph type="sldNum" sz="quarter" idx="5"/>
+          </p:nvPr>
+        </p:nvSpPr>
+        <p:spPr/>
+        <p:txBody>
+          <a:bodyPr/>
+          <a:lstStyle/>
+          <a:p>
+            <a:fld id="{20E893CD-DF8E-471B-AB49-852E001861FD}" type="slidenum">
+              <a:rPr lang="en-US" smtClean="0"/>
+              <a:t>17</a:t>
+            </a:fld>
+            <a:endParaRPr lang="en-US"/>
+          </a:p>
+        </p:txBody>
+      </p:sp>
+    </p:spTree>
+    <p:extLst>
+      <p:ext uri="{BB962C8B-B14F-4D97-AF65-F5344CB8AC3E}">
+        <p14:creationId xmlns:p14="http://schemas.microsoft.com/office/powerpoint/2010/main" val="796022252"/>
+      </p:ext>
+    </p:extLst>
+  </p:cSld>
+  <p:clrMapOvr>
+    <a:masterClrMapping/>
+  </p:clrMapOvr>
+</p:notes>
+</file>
+
+<file path=ppt/notesSlides/notesSlide11.xml><?xml version="1.0" encoding="utf-8"?>
+<p:notes xmlns:a="http://schemas.openxmlformats.org/drawingml/2006/main" xmlns:r="http://schemas.openxmlformats.org/officeDocument/2006/relationships" xmlns:p="http://schemas.openxmlformats.org/presentationml/2006/main">
+  <p:cSld>
+    <p:spTree>
+      <p:nvGrpSpPr>
+        <p:cNvPr id="1" name=""/>
+        <p:cNvGrpSpPr/>
+        <p:nvPr/>
+      </p:nvGrpSpPr>
+      <p:grpSpPr>
+        <a:xfrm>
+          <a:off x="0" y="0"/>
+          <a:ext cx="0" cy="0"/>
+          <a:chOff x="0" y="0"/>
+          <a:chExt cx="0" cy="0"/>
+        </a:xfrm>
+      </p:grpSpPr>
+      <p:sp>
+        <p:nvSpPr>
+          <p:cNvPr id="2" name="Slide Image Placeholder 1"/>
+          <p:cNvSpPr>
+            <a:spLocks noGrp="1" noRot="1" noChangeAspect="1"/>
+          </p:cNvSpPr>
+          <p:nvPr>
+            <p:ph type="sldImg"/>
+          </p:nvPr>
+        </p:nvSpPr>
+        <p:spPr/>
+      </p:sp>
+      <p:sp>
+        <p:nvSpPr>
+          <p:cNvPr id="3" name="Notes Placeholder 2"/>
+          <p:cNvSpPr>
+            <a:spLocks noGrp="1"/>
+          </p:cNvSpPr>
+          <p:nvPr>
+            <p:ph type="body" idx="1"/>
+          </p:nvPr>
+        </p:nvSpPr>
+        <p:spPr/>
+        <p:txBody>
+          <a:bodyPr/>
+          <a:lstStyle/>
+          <a:p>
+            <a:r>
+              <a:rPr lang="es-MX" dirty="0"/>
+              <a:t>Imagínese que podemos describir el siguiente árbol como una abstracción de una </a:t>
+            </a:r>
+            <a:r>
+              <a:rPr lang="es-MX" dirty="0" err="1"/>
+              <a:t>ciclovia</a:t>
+            </a:r>
+            <a:r>
+              <a:rPr lang="es-MX" dirty="0"/>
+              <a:t> en el cual cada </a:t>
+            </a:r>
+            <a:r>
+              <a:rPr lang="es-MX" dirty="0" err="1"/>
+              <a:t>uniónentre</a:t>
+            </a:r>
+            <a:r>
+              <a:rPr lang="es-MX" dirty="0"/>
+              <a:t> nodos representa una pista y cada nodo una bifurcación o una toma de agua, puede ser cualquier cosa</a:t>
+            </a:r>
+          </a:p>
+          <a:p>
+            <a:endParaRPr lang="en-US" dirty="0"/>
+          </a:p>
+        </p:txBody>
+      </p:sp>
+      <p:sp>
+        <p:nvSpPr>
+          <p:cNvPr id="4" name="Slide Number Placeholder 3"/>
+          <p:cNvSpPr>
+            <a:spLocks noGrp="1"/>
+          </p:cNvSpPr>
+          <p:nvPr>
+            <p:ph type="sldNum" sz="quarter" idx="5"/>
+          </p:nvPr>
+        </p:nvSpPr>
+        <p:spPr/>
+        <p:txBody>
+          <a:bodyPr/>
+          <a:lstStyle/>
+          <a:p>
+            <a:fld id="{20E893CD-DF8E-471B-AB49-852E001861FD}" type="slidenum">
+              <a:rPr lang="en-US" smtClean="0"/>
+              <a:t>18</a:t>
+            </a:fld>
+            <a:endParaRPr lang="en-US"/>
+          </a:p>
+        </p:txBody>
+      </p:sp>
+    </p:spTree>
+    <p:extLst>
+      <p:ext uri="{BB962C8B-B14F-4D97-AF65-F5344CB8AC3E}">
+        <p14:creationId xmlns:p14="http://schemas.microsoft.com/office/powerpoint/2010/main" val="1157636357"/>
+      </p:ext>
+    </p:extLst>
+  </p:cSld>
+  <p:clrMapOvr>
+    <a:masterClrMapping/>
+  </p:clrMapOvr>
+</p:notes>
+</file>
+
+<file path=ppt/notesSlides/notesSlide12.xml><?xml version="1.0" encoding="utf-8"?>
+<p:notes xmlns:a="http://schemas.openxmlformats.org/drawingml/2006/main" xmlns:r="http://schemas.openxmlformats.org/officeDocument/2006/relationships" xmlns:p="http://schemas.openxmlformats.org/presentationml/2006/main">
+  <p:cSld>
+    <p:spTree>
+      <p:nvGrpSpPr>
+        <p:cNvPr id="1" name=""/>
+        <p:cNvGrpSpPr/>
+        <p:nvPr/>
+      </p:nvGrpSpPr>
+      <p:grpSpPr>
+        <a:xfrm>
+          <a:off x="0" y="0"/>
+          <a:ext cx="0" cy="0"/>
+          <a:chOff x="0" y="0"/>
+          <a:chExt cx="0" cy="0"/>
+        </a:xfrm>
+      </p:grpSpPr>
+      <p:sp>
+        <p:nvSpPr>
+          <p:cNvPr id="2" name="Slide Image Placeholder 1"/>
+          <p:cNvSpPr>
+            <a:spLocks noGrp="1" noRot="1" noChangeAspect="1"/>
+          </p:cNvSpPr>
+          <p:nvPr>
+            <p:ph type="sldImg"/>
+          </p:nvPr>
+        </p:nvSpPr>
+        <p:spPr/>
+      </p:sp>
+      <p:sp>
+        <p:nvSpPr>
+          <p:cNvPr id="3" name="Notes Placeholder 2"/>
+          <p:cNvSpPr>
+            <a:spLocks noGrp="1"/>
+          </p:cNvSpPr>
+          <p:nvPr>
+            <p:ph type="body" idx="1"/>
+          </p:nvPr>
+        </p:nvSpPr>
+        <p:spPr/>
+        <p:txBody>
+          <a:bodyPr/>
+          <a:lstStyle/>
+          <a:p>
+            <a:endParaRPr lang="en-US" dirty="0"/>
+          </a:p>
+        </p:txBody>
+      </p:sp>
+      <p:sp>
+        <p:nvSpPr>
+          <p:cNvPr id="4" name="Slide Number Placeholder 3"/>
+          <p:cNvSpPr>
+            <a:spLocks noGrp="1"/>
+          </p:cNvSpPr>
+          <p:nvPr>
+            <p:ph type="sldNum" sz="quarter" idx="5"/>
+          </p:nvPr>
+        </p:nvSpPr>
+        <p:spPr/>
+        <p:txBody>
+          <a:bodyPr/>
+          <a:lstStyle/>
+          <a:p>
+            <a:fld id="{20E893CD-DF8E-471B-AB49-852E001861FD}" type="slidenum">
+              <a:rPr lang="en-US" smtClean="0"/>
+              <a:t>25</a:t>
+            </a:fld>
+            <a:endParaRPr lang="en-US"/>
+          </a:p>
+        </p:txBody>
+      </p:sp>
+    </p:spTree>
+    <p:extLst>
+      <p:ext uri="{BB962C8B-B14F-4D97-AF65-F5344CB8AC3E}">
+        <p14:creationId xmlns:p14="http://schemas.microsoft.com/office/powerpoint/2010/main" val="1188173255"/>
+      </p:ext>
+    </p:extLst>
+  </p:cSld>
+  <p:clrMapOvr>
+    <a:masterClrMapping/>
+  </p:clrMapOvr>
+</p:notes>
+</file>
+
+<file path=ppt/notesSlides/notesSlide13.xml><?xml version="1.0" encoding="utf-8"?>
 <p:notes xmlns:a="http://schemas.openxmlformats.org/drawingml/2006/main" xmlns:r="http://schemas.openxmlformats.org/officeDocument/2006/relationships" xmlns:p="http://schemas.openxmlformats.org/presentationml/2006/main">
   <p:cSld>
     <p:spTree>
@@ -1609,7 +1924,7 @@
           <a:p>
             <a:fld id="{20E893CD-DF8E-471B-AB49-852E001861FD}" type="slidenum">
               <a:rPr lang="en-US" smtClean="0"/>
-              <a:t>25</a:t>
+              <a:t>16</a:t>
             </a:fld>
             <a:endParaRPr lang="en-US"/>
           </a:p>
@@ -1618,7 +1933,7 @@
     </p:spTree>
     <p:extLst>
       <p:ext uri="{BB962C8B-B14F-4D97-AF65-F5344CB8AC3E}">
-        <p14:creationId xmlns:p14="http://schemas.microsoft.com/office/powerpoint/2010/main" val="1188173255"/>
+        <p14:creationId xmlns:p14="http://schemas.microsoft.com/office/powerpoint/2010/main" val="2174971933"/>
       </p:ext>
     </p:extLst>
   </p:cSld>
@@ -15850,11 +16165,11 @@
           <p:nvPr/>
         </p:nvPicPr>
         <p:blipFill>
-          <a:blip r:embed="rId2" cstate="print">
+          <a:blip r:embed="rId3" cstate="print">
             <a:extLst>
               <a:ext uri="{BEBA8EAE-BF5A-486C-A8C5-ECC9F3942E4B}">
                 <a14:imgProps xmlns:a14="http://schemas.microsoft.com/office/drawing/2010/main">
-                  <a14:imgLayer r:embed="rId3">
+                  <a14:imgLayer r:embed="rId4">
                     <a14:imgEffect>
                       <a14:backgroundRemoval t="10000" b="90000" l="10000" r="90000">
                         <a14:backgroundMark x1="42017" y1="40000" x2="43277" y2="41600"/>
@@ -15914,7 +16229,7 @@
           <p:nvPr/>
         </p:nvPicPr>
         <p:blipFill>
-          <a:blip r:embed="rId4" cstate="print">
+          <a:blip r:embed="rId5" cstate="print">
             <a:extLst>
               <a:ext uri="{28A0092B-C50C-407E-A947-70E740481C1C}">
                 <a14:useLocalDpi xmlns:a14="http://schemas.microsoft.com/office/drawing/2010/main" val="0"/>
@@ -15961,7 +16276,7 @@
           <p:nvPr/>
         </p:nvPicPr>
         <p:blipFill>
-          <a:blip r:embed="rId4" cstate="print">
+          <a:blip r:embed="rId5" cstate="print">
             <a:extLst>
               <a:ext uri="{28A0092B-C50C-407E-A947-70E740481C1C}">
                 <a14:useLocalDpi xmlns:a14="http://schemas.microsoft.com/office/drawing/2010/main" val="0"/>
@@ -16008,7 +16323,7 @@
           <p:nvPr/>
         </p:nvPicPr>
         <p:blipFill>
-          <a:blip r:embed="rId4" cstate="print">
+          <a:blip r:embed="rId5" cstate="print">
             <a:extLst>
               <a:ext uri="{28A0092B-C50C-407E-A947-70E740481C1C}">
                 <a14:useLocalDpi xmlns:a14="http://schemas.microsoft.com/office/drawing/2010/main" val="0"/>
@@ -16055,7 +16370,7 @@
           <p:nvPr/>
         </p:nvPicPr>
         <p:blipFill>
-          <a:blip r:embed="rId4" cstate="print">
+          <a:blip r:embed="rId5" cstate="print">
             <a:extLst>
               <a:ext uri="{28A0092B-C50C-407E-A947-70E740481C1C}">
                 <a14:useLocalDpi xmlns:a14="http://schemas.microsoft.com/office/drawing/2010/main" val="0"/>
@@ -16102,7 +16417,7 @@
           <p:nvPr/>
         </p:nvPicPr>
         <p:blipFill>
-          <a:blip r:embed="rId4" cstate="print">
+          <a:blip r:embed="rId5" cstate="print">
             <a:extLst>
               <a:ext uri="{28A0092B-C50C-407E-A947-70E740481C1C}">
                 <a14:useLocalDpi xmlns:a14="http://schemas.microsoft.com/office/drawing/2010/main" val="0"/>
@@ -16149,7 +16464,7 @@
           <p:nvPr/>
         </p:nvPicPr>
         <p:blipFill>
-          <a:blip r:embed="rId4" cstate="print">
+          <a:blip r:embed="rId5" cstate="print">
             <a:extLst>
               <a:ext uri="{28A0092B-C50C-407E-A947-70E740481C1C}">
                 <a14:useLocalDpi xmlns:a14="http://schemas.microsoft.com/office/drawing/2010/main" val="0"/>
@@ -16196,7 +16511,7 @@
           <p:nvPr/>
         </p:nvPicPr>
         <p:blipFill>
-          <a:blip r:embed="rId4" cstate="print">
+          <a:blip r:embed="rId5" cstate="print">
             <a:extLst>
               <a:ext uri="{28A0092B-C50C-407E-A947-70E740481C1C}">
                 <a14:useLocalDpi xmlns:a14="http://schemas.microsoft.com/office/drawing/2010/main" val="0"/>

</xml_diff>